<commit_message>
Added explanation about Init file and recreated PDF
</commit_message>
<xml_diff>
--- a/basic_new/Module 04 - Python Functions.pptx
+++ b/basic_new/Module 04 - Python Functions.pptx
@@ -5,7 +5,7 @@
     <p:sldMasterId id="2147483717" r:id="rId1"/>
   </p:sldMasterIdLst>
   <p:notesMasterIdLst>
-    <p:notesMasterId r:id="rId31"/>
+    <p:notesMasterId r:id="rId34"/>
   </p:notesMasterIdLst>
   <p:sldIdLst>
     <p:sldId id="257" r:id="rId2"/>
@@ -32,11 +32,14 @@
     <p:sldId id="336" r:id="rId23"/>
     <p:sldId id="337" r:id="rId24"/>
     <p:sldId id="338" r:id="rId25"/>
-    <p:sldId id="339" r:id="rId26"/>
-    <p:sldId id="340" r:id="rId27"/>
-    <p:sldId id="294" r:id="rId28"/>
-    <p:sldId id="308" r:id="rId29"/>
-    <p:sldId id="316" r:id="rId30"/>
+    <p:sldId id="341" r:id="rId26"/>
+    <p:sldId id="342" r:id="rId27"/>
+    <p:sldId id="308" r:id="rId28"/>
+    <p:sldId id="343" r:id="rId29"/>
+    <p:sldId id="339" r:id="rId30"/>
+    <p:sldId id="340" r:id="rId31"/>
+    <p:sldId id="294" r:id="rId32"/>
+    <p:sldId id="316" r:id="rId33"/>
   </p:sldIdLst>
   <p:sldSz cx="12192000" cy="6858000"/>
   <p:notesSz cx="6858000" cy="9144000"/>
@@ -152,16 +155,433 @@
 <file path=ppt/revisionInfo.xml><?xml version="1.0" encoding="utf-8"?>
 <p1510:revInfo xmlns:a="http://schemas.openxmlformats.org/drawingml/2006/main" xmlns:r="http://schemas.openxmlformats.org/officeDocument/2006/relationships" xmlns:p1510="http://schemas.microsoft.com/office/powerpoint/2015/10/main">
   <p1510:revLst>
-    <p1510:client id="{18518D72-659F-BC1B-1C5D-4788DBEB738E}" v="21" dt="2022-01-19T08:30:43.553"/>
-    <p1510:client id="{1DC4A7C7-CE4F-3205-974E-8156ED17CB91}" v="2" dt="2022-01-16T14:59:56.065"/>
-    <p1510:client id="{D330ABF8-AE4D-B4F8-FC89-666F486D5107}" v="22" dt="2022-01-16T12:14:58.183"/>
-    <p1510:client id="{E0560987-A678-7011-C436-4C0A86D5401F}" v="99" dt="2023-06-15T16:19:03.619"/>
+    <p1510:client id="{A2A03E3F-62B1-4E58-A617-0C8BD9481F1D}" v="25" dt="2023-06-27T08:42:49.896"/>
   </p1510:revLst>
 </p1510:revInfo>
 </file>
 
 <file path=ppt/changesInfos/changesInfo1.xml><?xml version="1.0" encoding="utf-8"?>
 <pc:chgInfo xmlns:a="http://schemas.openxmlformats.org/drawingml/2006/main" xmlns:r="http://schemas.openxmlformats.org/officeDocument/2006/relationships" xmlns:ac="http://schemas.microsoft.com/office/drawing/2013/main/command" xmlns:pc="http://schemas.microsoft.com/office/powerpoint/2013/main/command">
+  <pc:docChgLst>
+    <pc:chgData name="Grace Alison Yurkov" userId="b81c3101a651c776" providerId="LiveId" clId="{A2A03E3F-62B1-4E58-A617-0C8BD9481F1D}"/>
+    <pc:docChg chg="undo custSel addSld modSld sldOrd">
+      <pc:chgData name="Grace Alison Yurkov" userId="b81c3101a651c776" providerId="LiveId" clId="{A2A03E3F-62B1-4E58-A617-0C8BD9481F1D}" dt="2023-06-27T08:44:01.416" v="133" actId="14100"/>
+      <pc:docMkLst>
+        <pc:docMk/>
+      </pc:docMkLst>
+      <pc:sldChg chg="modSp mod ord">
+        <pc:chgData name="Grace Alison Yurkov" userId="b81c3101a651c776" providerId="LiveId" clId="{A2A03E3F-62B1-4E58-A617-0C8BD9481F1D}" dt="2023-06-27T08:37:21.347" v="47" actId="20577"/>
+        <pc:sldMkLst>
+          <pc:docMk/>
+          <pc:sldMk cId="3816041889" sldId="308"/>
+        </pc:sldMkLst>
+        <pc:spChg chg="mod">
+          <ac:chgData name="Grace Alison Yurkov" userId="b81c3101a651c776" providerId="LiveId" clId="{A2A03E3F-62B1-4E58-A617-0C8BD9481F1D}" dt="2023-06-27T08:37:21.347" v="47" actId="20577"/>
+          <ac:spMkLst>
+            <pc:docMk/>
+            <pc:sldMk cId="3816041889" sldId="308"/>
+            <ac:spMk id="7" creationId="{00000000-0000-0000-0000-000000000000}"/>
+          </ac:spMkLst>
+        </pc:spChg>
+      </pc:sldChg>
+      <pc:sldChg chg="modSp add mod">
+        <pc:chgData name="Grace Alison Yurkov" userId="b81c3101a651c776" providerId="LiveId" clId="{A2A03E3F-62B1-4E58-A617-0C8BD9481F1D}" dt="2023-06-27T08:34:11.228" v="11" actId="27636"/>
+        <pc:sldMkLst>
+          <pc:docMk/>
+          <pc:sldMk cId="702368095" sldId="341"/>
+        </pc:sldMkLst>
+        <pc:spChg chg="mod">
+          <ac:chgData name="Grace Alison Yurkov" userId="b81c3101a651c776" providerId="LiveId" clId="{A2A03E3F-62B1-4E58-A617-0C8BD9481F1D}" dt="2023-06-27T08:33:06.368" v="9" actId="20577"/>
+          <ac:spMkLst>
+            <pc:docMk/>
+            <pc:sldMk cId="702368095" sldId="341"/>
+            <ac:spMk id="2" creationId="{00000000-0000-0000-0000-000000000000}"/>
+          </ac:spMkLst>
+        </pc:spChg>
+        <pc:spChg chg="mod">
+          <ac:chgData name="Grace Alison Yurkov" userId="b81c3101a651c776" providerId="LiveId" clId="{A2A03E3F-62B1-4E58-A617-0C8BD9481F1D}" dt="2023-06-27T08:34:11.228" v="11" actId="27636"/>
+          <ac:spMkLst>
+            <pc:docMk/>
+            <pc:sldMk cId="702368095" sldId="341"/>
+            <ac:spMk id="3" creationId="{00000000-0000-0000-0000-000000000000}"/>
+          </ac:spMkLst>
+        </pc:spChg>
+      </pc:sldChg>
+      <pc:sldChg chg="modSp add mod">
+        <pc:chgData name="Grace Alison Yurkov" userId="b81c3101a651c776" providerId="LiveId" clId="{A2A03E3F-62B1-4E58-A617-0C8BD9481F1D}" dt="2023-06-27T08:36:40.221" v="32" actId="113"/>
+        <pc:sldMkLst>
+          <pc:docMk/>
+          <pc:sldMk cId="3387540484" sldId="342"/>
+        </pc:sldMkLst>
+        <pc:spChg chg="mod">
+          <ac:chgData name="Grace Alison Yurkov" userId="b81c3101a651c776" providerId="LiveId" clId="{A2A03E3F-62B1-4E58-A617-0C8BD9481F1D}" dt="2023-06-27T08:34:21.784" v="23" actId="20577"/>
+          <ac:spMkLst>
+            <pc:docMk/>
+            <pc:sldMk cId="3387540484" sldId="342"/>
+            <ac:spMk id="2" creationId="{00000000-0000-0000-0000-000000000000}"/>
+          </ac:spMkLst>
+        </pc:spChg>
+        <pc:spChg chg="mod">
+          <ac:chgData name="Grace Alison Yurkov" userId="b81c3101a651c776" providerId="LiveId" clId="{A2A03E3F-62B1-4E58-A617-0C8BD9481F1D}" dt="2023-06-27T08:36:40.221" v="32" actId="113"/>
+          <ac:spMkLst>
+            <pc:docMk/>
+            <pc:sldMk cId="3387540484" sldId="342"/>
+            <ac:spMk id="3" creationId="{00000000-0000-0000-0000-000000000000}"/>
+          </ac:spMkLst>
+        </pc:spChg>
+      </pc:sldChg>
+      <pc:sldChg chg="addSp delSp modSp add mod ord">
+        <pc:chgData name="Grace Alison Yurkov" userId="b81c3101a651c776" providerId="LiveId" clId="{A2A03E3F-62B1-4E58-A617-0C8BD9481F1D}" dt="2023-06-27T08:44:01.416" v="133" actId="14100"/>
+        <pc:sldMkLst>
+          <pc:docMk/>
+          <pc:sldMk cId="155986256" sldId="343"/>
+        </pc:sldMkLst>
+        <pc:spChg chg="mod">
+          <ac:chgData name="Grace Alison Yurkov" userId="b81c3101a651c776" providerId="LiveId" clId="{A2A03E3F-62B1-4E58-A617-0C8BD9481F1D}" dt="2023-06-27T08:37:30.956" v="53" actId="20577"/>
+          <ac:spMkLst>
+            <pc:docMk/>
+            <pc:sldMk cId="155986256" sldId="343"/>
+            <ac:spMk id="2" creationId="{00000000-0000-0000-0000-000000000000}"/>
+          </ac:spMkLst>
+        </pc:spChg>
+        <pc:spChg chg="mod">
+          <ac:chgData name="Grace Alison Yurkov" userId="b81c3101a651c776" providerId="LiveId" clId="{A2A03E3F-62B1-4E58-A617-0C8BD9481F1D}" dt="2023-06-27T08:40:44.911" v="75"/>
+          <ac:spMkLst>
+            <pc:docMk/>
+            <pc:sldMk cId="155986256" sldId="343"/>
+            <ac:spMk id="3" creationId="{00000000-0000-0000-0000-000000000000}"/>
+          </ac:spMkLst>
+        </pc:spChg>
+        <pc:spChg chg="add mod">
+          <ac:chgData name="Grace Alison Yurkov" userId="b81c3101a651c776" providerId="LiveId" clId="{A2A03E3F-62B1-4E58-A617-0C8BD9481F1D}" dt="2023-06-27T08:41:23.047" v="83" actId="1076"/>
+          <ac:spMkLst>
+            <pc:docMk/>
+            <pc:sldMk cId="155986256" sldId="343"/>
+            <ac:spMk id="4" creationId="{A85D0F14-442C-49F7-ADFB-99D77B2DDF95}"/>
+          </ac:spMkLst>
+        </pc:spChg>
+        <pc:spChg chg="add mod">
+          <ac:chgData name="Grace Alison Yurkov" userId="b81c3101a651c776" providerId="LiveId" clId="{A2A03E3F-62B1-4E58-A617-0C8BD9481F1D}" dt="2023-06-27T08:41:20.070" v="82" actId="1076"/>
+          <ac:spMkLst>
+            <pc:docMk/>
+            <pc:sldMk cId="155986256" sldId="343"/>
+            <ac:spMk id="5" creationId="{82A847D9-4ED2-EE2B-0051-DBD80C0458EC}"/>
+          </ac:spMkLst>
+        </pc:spChg>
+        <pc:spChg chg="add mod">
+          <ac:chgData name="Grace Alison Yurkov" userId="b81c3101a651c776" providerId="LiveId" clId="{A2A03E3F-62B1-4E58-A617-0C8BD9481F1D}" dt="2023-06-27T08:41:26.397" v="84" actId="1076"/>
+          <ac:spMkLst>
+            <pc:docMk/>
+            <pc:sldMk cId="155986256" sldId="343"/>
+            <ac:spMk id="6" creationId="{6D563575-3803-076C-98B5-CD348B7CD569}"/>
+          </ac:spMkLst>
+        </pc:spChg>
+        <pc:spChg chg="add del mod">
+          <ac:chgData name="Grace Alison Yurkov" userId="b81c3101a651c776" providerId="LiveId" clId="{A2A03E3F-62B1-4E58-A617-0C8BD9481F1D}" dt="2023-06-27T08:41:57.464" v="99" actId="478"/>
+          <ac:spMkLst>
+            <pc:docMk/>
+            <pc:sldMk cId="155986256" sldId="343"/>
+            <ac:spMk id="7" creationId="{20B2C227-3DAE-5EB1-9410-D325A0B4BEAA}"/>
+          </ac:spMkLst>
+        </pc:spChg>
+        <pc:spChg chg="add mod">
+          <ac:chgData name="Grace Alison Yurkov" userId="b81c3101a651c776" providerId="LiveId" clId="{A2A03E3F-62B1-4E58-A617-0C8BD9481F1D}" dt="2023-06-27T08:44:01.416" v="133" actId="14100"/>
+          <ac:spMkLst>
+            <pc:docMk/>
+            <pc:sldMk cId="155986256" sldId="343"/>
+            <ac:spMk id="8" creationId="{9C77D842-28C8-1066-22D7-AA317B24DD43}"/>
+          </ac:spMkLst>
+        </pc:spChg>
+        <pc:spChg chg="add del">
+          <ac:chgData name="Grace Alison Yurkov" userId="b81c3101a651c776" providerId="LiveId" clId="{A2A03E3F-62B1-4E58-A617-0C8BD9481F1D}" dt="2023-06-27T08:42:25.597" v="122" actId="478"/>
+          <ac:spMkLst>
+            <pc:docMk/>
+            <pc:sldMk cId="155986256" sldId="343"/>
+            <ac:spMk id="10" creationId="{69A5BD03-AEBD-27CF-B16E-FB03BD5181B9}"/>
+          </ac:spMkLst>
+        </pc:spChg>
+        <pc:spChg chg="add mod">
+          <ac:chgData name="Grace Alison Yurkov" userId="b81c3101a651c776" providerId="LiveId" clId="{A2A03E3F-62B1-4E58-A617-0C8BD9481F1D}" dt="2023-06-27T08:42:38.825" v="127" actId="1076"/>
+          <ac:spMkLst>
+            <pc:docMk/>
+            <pc:sldMk cId="155986256" sldId="343"/>
+            <ac:spMk id="11" creationId="{BD666A9C-C093-DAAB-8433-E94D1807ECE5}"/>
+          </ac:spMkLst>
+        </pc:spChg>
+        <pc:spChg chg="add mod">
+          <ac:chgData name="Grace Alison Yurkov" userId="b81c3101a651c776" providerId="LiveId" clId="{A2A03E3F-62B1-4E58-A617-0C8BD9481F1D}" dt="2023-06-27T08:42:49.896" v="129"/>
+          <ac:spMkLst>
+            <pc:docMk/>
+            <pc:sldMk cId="155986256" sldId="343"/>
+            <ac:spMk id="12" creationId="{88412B13-816F-7D10-A841-CDCB5B0C51F2}"/>
+          </ac:spMkLst>
+        </pc:spChg>
+      </pc:sldChg>
+    </pc:docChg>
+  </pc:docChgLst>
+  <pc:docChgLst>
+    <pc:chgData name="Tomer Avishar" userId="S::tomerav@sela.co.il::6f99e47e-5b46-447c-a55a-283bba137982" providerId="AD" clId="Web-{1DC4A7C7-CE4F-3205-974E-8156ED17CB91}"/>
+    <pc:docChg chg="modSld">
+      <pc:chgData name="Tomer Avishar" userId="S::tomerav@sela.co.il::6f99e47e-5b46-447c-a55a-283bba137982" providerId="AD" clId="Web-{1DC4A7C7-CE4F-3205-974E-8156ED17CB91}" dt="2022-01-16T14:59:56.065" v="0"/>
+      <pc:docMkLst>
+        <pc:docMk/>
+      </pc:docMkLst>
+      <pc:sldChg chg="addSp">
+        <pc:chgData name="Tomer Avishar" userId="S::tomerav@sela.co.il::6f99e47e-5b46-447c-a55a-283bba137982" providerId="AD" clId="Web-{1DC4A7C7-CE4F-3205-974E-8156ED17CB91}" dt="2022-01-16T14:59:56.065" v="0"/>
+        <pc:sldMkLst>
+          <pc:docMk/>
+          <pc:sldMk cId="715340640" sldId="267"/>
+        </pc:sldMkLst>
+        <pc:spChg chg="add">
+          <ac:chgData name="Tomer Avishar" userId="S::tomerav@sela.co.il::6f99e47e-5b46-447c-a55a-283bba137982" providerId="AD" clId="Web-{1DC4A7C7-CE4F-3205-974E-8156ED17CB91}" dt="2022-01-16T14:59:56.065" v="0"/>
+          <ac:spMkLst>
+            <pc:docMk/>
+            <pc:sldMk cId="715340640" sldId="267"/>
+            <ac:spMk id="4" creationId="{BB2FB569-B4F9-42D8-84FB-8F12F35F05FF}"/>
+          </ac:spMkLst>
+        </pc:spChg>
+      </pc:sldChg>
+    </pc:docChg>
+  </pc:docChgLst>
+  <pc:docChgLst>
+    <pc:chgData name="Tomer Avishar" userId="S::tomerav@sela.co.il::6f99e47e-5b46-447c-a55a-283bba137982" providerId="AD" clId="Web-{D330ABF8-AE4D-B4F8-FC89-666F486D5107}"/>
+    <pc:docChg chg="delSld modSld">
+      <pc:chgData name="Tomer Avishar" userId="S::tomerav@sela.co.il::6f99e47e-5b46-447c-a55a-283bba137982" providerId="AD" clId="Web-{D330ABF8-AE4D-B4F8-FC89-666F486D5107}" dt="2022-01-16T12:14:55.699" v="13" actId="20577"/>
+      <pc:docMkLst>
+        <pc:docMk/>
+      </pc:docMkLst>
+      <pc:sldChg chg="modSp">
+        <pc:chgData name="Tomer Avishar" userId="S::tomerav@sela.co.il::6f99e47e-5b46-447c-a55a-283bba137982" providerId="AD" clId="Web-{D330ABF8-AE4D-B4F8-FC89-666F486D5107}" dt="2022-01-16T12:13:38.369" v="0" actId="14100"/>
+        <pc:sldMkLst>
+          <pc:docMk/>
+          <pc:sldMk cId="2492001281" sldId="280"/>
+        </pc:sldMkLst>
+        <pc:spChg chg="mod">
+          <ac:chgData name="Tomer Avishar" userId="S::tomerav@sela.co.il::6f99e47e-5b46-447c-a55a-283bba137982" providerId="AD" clId="Web-{D330ABF8-AE4D-B4F8-FC89-666F486D5107}" dt="2022-01-16T12:13:38.369" v="0" actId="14100"/>
+          <ac:spMkLst>
+            <pc:docMk/>
+            <pc:sldMk cId="2492001281" sldId="280"/>
+            <ac:spMk id="13" creationId="{F3BD2BD0-202C-40FC-8573-610EE63FC528}"/>
+          </ac:spMkLst>
+        </pc:spChg>
+      </pc:sldChg>
+      <pc:sldChg chg="delCm">
+        <pc:chgData name="Tomer Avishar" userId="S::tomerav@sela.co.il::6f99e47e-5b46-447c-a55a-283bba137982" providerId="AD" clId="Web-{D330ABF8-AE4D-B4F8-FC89-666F486D5107}" dt="2022-01-16T12:13:49.713" v="1"/>
+        <pc:sldMkLst>
+          <pc:docMk/>
+          <pc:sldMk cId="2767821557" sldId="294"/>
+        </pc:sldMkLst>
+      </pc:sldChg>
+      <pc:sldChg chg="del delCm">
+        <pc:chgData name="Tomer Avishar" userId="S::tomerav@sela.co.il::6f99e47e-5b46-447c-a55a-283bba137982" providerId="AD" clId="Web-{D330ABF8-AE4D-B4F8-FC89-666F486D5107}" dt="2022-01-16T12:14:14.089" v="3"/>
+        <pc:sldMkLst>
+          <pc:docMk/>
+          <pc:sldMk cId="2746262724" sldId="295"/>
+        </pc:sldMkLst>
+      </pc:sldChg>
+      <pc:sldChg chg="modSp">
+        <pc:chgData name="Tomer Avishar" userId="S::tomerav@sela.co.il::6f99e47e-5b46-447c-a55a-283bba137982" providerId="AD" clId="Web-{D330ABF8-AE4D-B4F8-FC89-666F486D5107}" dt="2022-01-16T12:14:55.699" v="13" actId="20577"/>
+        <pc:sldMkLst>
+          <pc:docMk/>
+          <pc:sldMk cId="1380134214" sldId="309"/>
+        </pc:sldMkLst>
+        <pc:spChg chg="mod">
+          <ac:chgData name="Tomer Avishar" userId="S::tomerav@sela.co.il::6f99e47e-5b46-447c-a55a-283bba137982" providerId="AD" clId="Web-{D330ABF8-AE4D-B4F8-FC89-666F486D5107}" dt="2022-01-16T12:14:55.699" v="13" actId="20577"/>
+          <ac:spMkLst>
+            <pc:docMk/>
+            <pc:sldMk cId="1380134214" sldId="309"/>
+            <ac:spMk id="6" creationId="{74F98662-678E-4B15-8F4B-F2B687111016}"/>
+          </ac:spMkLst>
+        </pc:spChg>
+      </pc:sldChg>
+    </pc:docChg>
+  </pc:docChgLst>
+  <pc:docChgLst>
+    <pc:chgData clId="Web-{1DC4A7C7-CE4F-3205-974E-8156ED17CB91}"/>
+    <pc:docChg chg="modSld">
+      <pc:chgData name="" userId="" providerId="" clId="Web-{1DC4A7C7-CE4F-3205-974E-8156ED17CB91}" dt="2022-01-16T14:59:31.361" v="0"/>
+      <pc:docMkLst>
+        <pc:docMk/>
+      </pc:docMkLst>
+      <pc:sldChg chg="addSp">
+        <pc:chgData name="" userId="" providerId="" clId="Web-{1DC4A7C7-CE4F-3205-974E-8156ED17CB91}" dt="2022-01-16T14:59:31.361" v="0"/>
+        <pc:sldMkLst>
+          <pc:docMk/>
+          <pc:sldMk cId="1629193451" sldId="257"/>
+        </pc:sldMkLst>
+        <pc:spChg chg="add">
+          <ac:chgData name="" userId="" providerId="" clId="Web-{1DC4A7C7-CE4F-3205-974E-8156ED17CB91}" dt="2022-01-16T14:59:31.361" v="0"/>
+          <ac:spMkLst>
+            <pc:docMk/>
+            <pc:sldMk cId="1629193451" sldId="257"/>
+            <ac:spMk id="3" creationId="{14FB7C35-71DA-4678-A4BC-B36886A75DA8}"/>
+          </ac:spMkLst>
+        </pc:spChg>
+      </pc:sldChg>
+    </pc:docChg>
+  </pc:docChgLst>
+  <pc:docChgLst>
+    <pc:chgData name="Tomer Avishar" userId="S::tomerav@sela.co.il::6f99e47e-5b46-447c-a55a-283bba137982" providerId="AD" clId="Web-{18518D72-659F-BC1B-1C5D-4788DBEB738E}"/>
+    <pc:docChg chg="modSld">
+      <pc:chgData name="Tomer Avishar" userId="S::tomerav@sela.co.il::6f99e47e-5b46-447c-a55a-283bba137982" providerId="AD" clId="Web-{18518D72-659F-BC1B-1C5D-4788DBEB738E}" dt="2022-01-19T08:46:13.847" v="1228"/>
+      <pc:docMkLst>
+        <pc:docMk/>
+      </pc:docMkLst>
+      <pc:sldChg chg="modNotes">
+        <pc:chgData name="Tomer Avishar" userId="S::tomerav@sela.co.il::6f99e47e-5b46-447c-a55a-283bba137982" providerId="AD" clId="Web-{18518D72-659F-BC1B-1C5D-4788DBEB738E}" dt="2022-01-19T07:42:32.329" v="152"/>
+        <pc:sldMkLst>
+          <pc:docMk/>
+          <pc:sldMk cId="89284741" sldId="264"/>
+        </pc:sldMkLst>
+      </pc:sldChg>
+      <pc:sldChg chg="modNotes">
+        <pc:chgData name="Tomer Avishar" userId="S::tomerav@sela.co.il::6f99e47e-5b46-447c-a55a-283bba137982" providerId="AD" clId="Web-{18518D72-659F-BC1B-1C5D-4788DBEB738E}" dt="2022-01-19T07:49:45.668" v="311"/>
+        <pc:sldMkLst>
+          <pc:docMk/>
+          <pc:sldMk cId="2304337233" sldId="266"/>
+        </pc:sldMkLst>
+      </pc:sldChg>
+      <pc:sldChg chg="modNotes">
+        <pc:chgData name="Tomer Avishar" userId="S::tomerav@sela.co.il::6f99e47e-5b46-447c-a55a-283bba137982" providerId="AD" clId="Web-{18518D72-659F-BC1B-1C5D-4788DBEB738E}" dt="2022-01-19T07:50:05.028" v="314"/>
+        <pc:sldMkLst>
+          <pc:docMk/>
+          <pc:sldMk cId="715340640" sldId="267"/>
+        </pc:sldMkLst>
+      </pc:sldChg>
+      <pc:sldChg chg="modSp modNotes">
+        <pc:chgData name="Tomer Avishar" userId="S::tomerav@sela.co.il::6f99e47e-5b46-447c-a55a-283bba137982" providerId="AD" clId="Web-{18518D72-659F-BC1B-1C5D-4788DBEB738E}" dt="2022-01-19T07:50:33.622" v="316" actId="14100"/>
+        <pc:sldMkLst>
+          <pc:docMk/>
+          <pc:sldMk cId="2689029024" sldId="270"/>
+        </pc:sldMkLst>
+        <pc:picChg chg="mod">
+          <ac:chgData name="Tomer Avishar" userId="S::tomerav@sela.co.il::6f99e47e-5b46-447c-a55a-283bba137982" providerId="AD" clId="Web-{18518D72-659F-BC1B-1C5D-4788DBEB738E}" dt="2022-01-19T07:50:33.622" v="316" actId="14100"/>
+          <ac:picMkLst>
+            <pc:docMk/>
+            <pc:sldMk cId="2689029024" sldId="270"/>
+            <ac:picMk id="5" creationId="{CB94E144-CDD6-4E31-BD08-A4728824C2AC}"/>
+          </ac:picMkLst>
+        </pc:picChg>
+      </pc:sldChg>
+      <pc:sldChg chg="modNotes">
+        <pc:chgData name="Tomer Avishar" userId="S::tomerav@sela.co.il::6f99e47e-5b46-447c-a55a-283bba137982" providerId="AD" clId="Web-{18518D72-659F-BC1B-1C5D-4788DBEB738E}" dt="2022-01-19T08:00:08.652" v="659"/>
+        <pc:sldMkLst>
+          <pc:docMk/>
+          <pc:sldMk cId="3214580080" sldId="271"/>
+        </pc:sldMkLst>
+      </pc:sldChg>
+      <pc:sldChg chg="modSp modNotes">
+        <pc:chgData name="Tomer Avishar" userId="S::tomerav@sela.co.il::6f99e47e-5b46-447c-a55a-283bba137982" providerId="AD" clId="Web-{18518D72-659F-BC1B-1C5D-4788DBEB738E}" dt="2022-01-19T08:35:01.101" v="983"/>
+        <pc:sldMkLst>
+          <pc:docMk/>
+          <pc:sldMk cId="836256761" sldId="273"/>
+        </pc:sldMkLst>
+        <pc:spChg chg="mod">
+          <ac:chgData name="Tomer Avishar" userId="S::tomerav@sela.co.il::6f99e47e-5b46-447c-a55a-283bba137982" providerId="AD" clId="Web-{18518D72-659F-BC1B-1C5D-4788DBEB738E}" dt="2022-01-19T08:29:33.221" v="665" actId="1076"/>
+          <ac:spMkLst>
+            <pc:docMk/>
+            <pc:sldMk cId="836256761" sldId="273"/>
+            <ac:spMk id="33" creationId="{D02A888E-5FC8-4540-8F3B-D8914D030D17}"/>
+          </ac:spMkLst>
+        </pc:spChg>
+        <pc:spChg chg="mod">
+          <ac:chgData name="Tomer Avishar" userId="S::tomerav@sela.co.il::6f99e47e-5b46-447c-a55a-283bba137982" providerId="AD" clId="Web-{18518D72-659F-BC1B-1C5D-4788DBEB738E}" dt="2022-01-19T08:30:39.835" v="678" actId="1076"/>
+          <ac:spMkLst>
+            <pc:docMk/>
+            <pc:sldMk cId="836256761" sldId="273"/>
+            <ac:spMk id="47" creationId="{00000000-0000-0000-0000-000000000000}"/>
+          </ac:spMkLst>
+        </pc:spChg>
+        <pc:spChg chg="mod">
+          <ac:chgData name="Tomer Avishar" userId="S::tomerav@sela.co.il::6f99e47e-5b46-447c-a55a-283bba137982" providerId="AD" clId="Web-{18518D72-659F-BC1B-1C5D-4788DBEB738E}" dt="2022-01-19T08:30:23.974" v="674" actId="14100"/>
+          <ac:spMkLst>
+            <pc:docMk/>
+            <pc:sldMk cId="836256761" sldId="273"/>
+            <ac:spMk id="48" creationId="{00000000-0000-0000-0000-000000000000}"/>
+          </ac:spMkLst>
+        </pc:spChg>
+        <pc:spChg chg="mod">
+          <ac:chgData name="Tomer Avishar" userId="S::tomerav@sela.co.il::6f99e47e-5b46-447c-a55a-283bba137982" providerId="AD" clId="Web-{18518D72-659F-BC1B-1C5D-4788DBEB738E}" dt="2022-01-19T08:29:50.034" v="667" actId="1076"/>
+          <ac:spMkLst>
+            <pc:docMk/>
+            <pc:sldMk cId="836256761" sldId="273"/>
+            <ac:spMk id="51" creationId="{00000000-0000-0000-0000-000000000000}"/>
+          </ac:spMkLst>
+        </pc:spChg>
+        <pc:spChg chg="mod">
+          <ac:chgData name="Tomer Avishar" userId="S::tomerav@sela.co.il::6f99e47e-5b46-447c-a55a-283bba137982" providerId="AD" clId="Web-{18518D72-659F-BC1B-1C5D-4788DBEB738E}" dt="2022-01-19T08:30:32.162" v="676" actId="1076"/>
+          <ac:spMkLst>
+            <pc:docMk/>
+            <pc:sldMk cId="836256761" sldId="273"/>
+            <ac:spMk id="52" creationId="{00000000-0000-0000-0000-000000000000}"/>
+          </ac:spMkLst>
+        </pc:spChg>
+        <pc:grpChg chg="mod">
+          <ac:chgData name="Tomer Avishar" userId="S::tomerav@sela.co.il::6f99e47e-5b46-447c-a55a-283bba137982" providerId="AD" clId="Web-{18518D72-659F-BC1B-1C5D-4788DBEB738E}" dt="2022-01-19T08:29:45.753" v="666" actId="1076"/>
+          <ac:grpSpMkLst>
+            <pc:docMk/>
+            <pc:sldMk cId="836256761" sldId="273"/>
+            <ac:grpSpMk id="61" creationId="{00000000-0000-0000-0000-000000000000}"/>
+          </ac:grpSpMkLst>
+        </pc:grpChg>
+        <pc:picChg chg="mod">
+          <ac:chgData name="Tomer Avishar" userId="S::tomerav@sela.co.il::6f99e47e-5b46-447c-a55a-283bba137982" providerId="AD" clId="Web-{18518D72-659F-BC1B-1C5D-4788DBEB738E}" dt="2022-01-19T08:29:17.782" v="662" actId="14100"/>
+          <ac:picMkLst>
+            <pc:docMk/>
+            <pc:sldMk cId="836256761" sldId="273"/>
+            <ac:picMk id="5" creationId="{EB4C8E04-D222-424F-B1D9-E4EFBA7C804A}"/>
+          </ac:picMkLst>
+        </pc:picChg>
+        <pc:cxnChg chg="mod">
+          <ac:chgData name="Tomer Avishar" userId="S::tomerav@sela.co.il::6f99e47e-5b46-447c-a55a-283bba137982" providerId="AD" clId="Web-{18518D72-659F-BC1B-1C5D-4788DBEB738E}" dt="2022-01-19T08:29:33.221" v="665" actId="1076"/>
+          <ac:cxnSpMkLst>
+            <pc:docMk/>
+            <pc:sldMk cId="836256761" sldId="273"/>
+            <ac:cxnSpMk id="34" creationId="{630AC0C4-7B96-4287-9C2B-D0D3666BB022}"/>
+          </ac:cxnSpMkLst>
+        </pc:cxnChg>
+        <pc:cxnChg chg="mod">
+          <ac:chgData name="Tomer Avishar" userId="S::tomerav@sela.co.il::6f99e47e-5b46-447c-a55a-283bba137982" providerId="AD" clId="Web-{18518D72-659F-BC1B-1C5D-4788DBEB738E}" dt="2022-01-19T08:29:58.582" v="669" actId="14100"/>
+          <ac:cxnSpMkLst>
+            <pc:docMk/>
+            <pc:sldMk cId="836256761" sldId="273"/>
+            <ac:cxnSpMk id="55" creationId="{00000000-0000-0000-0000-000000000000}"/>
+          </ac:cxnSpMkLst>
+        </pc:cxnChg>
+        <pc:cxnChg chg="mod">
+          <ac:chgData name="Tomer Avishar" userId="S::tomerav@sela.co.il::6f99e47e-5b46-447c-a55a-283bba137982" providerId="AD" clId="Web-{18518D72-659F-BC1B-1C5D-4788DBEB738E}" dt="2022-01-19T08:30:35.412" v="677" actId="14100"/>
+          <ac:cxnSpMkLst>
+            <pc:docMk/>
+            <pc:sldMk cId="836256761" sldId="273"/>
+            <ac:cxnSpMk id="56" creationId="{00000000-0000-0000-0000-000000000000}"/>
+          </ac:cxnSpMkLst>
+        </pc:cxnChg>
+        <pc:cxnChg chg="mod">
+          <ac:chgData name="Tomer Avishar" userId="S::tomerav@sela.co.il::6f99e47e-5b46-447c-a55a-283bba137982" providerId="AD" clId="Web-{18518D72-659F-BC1B-1C5D-4788DBEB738E}" dt="2022-01-19T08:30:28.865" v="675" actId="14100"/>
+          <ac:cxnSpMkLst>
+            <pc:docMk/>
+            <pc:sldMk cId="836256761" sldId="273"/>
+            <ac:cxnSpMk id="57" creationId="{00000000-0000-0000-0000-000000000000}"/>
+          </ac:cxnSpMkLst>
+        </pc:cxnChg>
+        <pc:cxnChg chg="mod">
+          <ac:chgData name="Tomer Avishar" userId="S::tomerav@sela.co.il::6f99e47e-5b46-447c-a55a-283bba137982" providerId="AD" clId="Web-{18518D72-659F-BC1B-1C5D-4788DBEB738E}" dt="2022-01-19T08:30:43.553" v="679" actId="14100"/>
+          <ac:cxnSpMkLst>
+            <pc:docMk/>
+            <pc:sldMk cId="836256761" sldId="273"/>
+            <ac:cxnSpMk id="60" creationId="{00000000-0000-0000-0000-000000000000}"/>
+          </ac:cxnSpMkLst>
+        </pc:cxnChg>
+      </pc:sldChg>
+      <pc:sldChg chg="modNotes">
+        <pc:chgData name="Tomer Avishar" userId="S::tomerav@sela.co.il::6f99e47e-5b46-447c-a55a-283bba137982" providerId="AD" clId="Web-{18518D72-659F-BC1B-1C5D-4788DBEB738E}" dt="2022-01-19T08:46:13.847" v="1228"/>
+        <pc:sldMkLst>
+          <pc:docMk/>
+          <pc:sldMk cId="1380134214" sldId="309"/>
+        </pc:sldMkLst>
+      </pc:sldChg>
+    </pc:docChg>
+  </pc:docChgLst>
   <pc:docChgLst>
     <pc:chgData name="Alexander Gotlib" userId="S::alexanderg@sela.co.il::ecaa1ea6-0ac0-4997-886b-e4a61a588c34" providerId="AD" clId="Web-{E0560987-A678-7011-C436-4C0A86D5401F}"/>
     <pc:docChg chg="addSld modSld">
@@ -415,269 +835,6 @@
       </pc:sldChg>
     </pc:docChg>
   </pc:docChgLst>
-  <pc:docChgLst>
-    <pc:chgData name="Tomer Avishar" userId="S::tomerav@sela.co.il::6f99e47e-5b46-447c-a55a-283bba137982" providerId="AD" clId="Web-{18518D72-659F-BC1B-1C5D-4788DBEB738E}"/>
-    <pc:docChg chg="modSld">
-      <pc:chgData name="Tomer Avishar" userId="S::tomerav@sela.co.il::6f99e47e-5b46-447c-a55a-283bba137982" providerId="AD" clId="Web-{18518D72-659F-BC1B-1C5D-4788DBEB738E}" dt="2022-01-19T08:46:13.847" v="1228"/>
-      <pc:docMkLst>
-        <pc:docMk/>
-      </pc:docMkLst>
-      <pc:sldChg chg="modNotes">
-        <pc:chgData name="Tomer Avishar" userId="S::tomerav@sela.co.il::6f99e47e-5b46-447c-a55a-283bba137982" providerId="AD" clId="Web-{18518D72-659F-BC1B-1C5D-4788DBEB738E}" dt="2022-01-19T07:42:32.329" v="152"/>
-        <pc:sldMkLst>
-          <pc:docMk/>
-          <pc:sldMk cId="89284741" sldId="264"/>
-        </pc:sldMkLst>
-      </pc:sldChg>
-      <pc:sldChg chg="modNotes">
-        <pc:chgData name="Tomer Avishar" userId="S::tomerav@sela.co.il::6f99e47e-5b46-447c-a55a-283bba137982" providerId="AD" clId="Web-{18518D72-659F-BC1B-1C5D-4788DBEB738E}" dt="2022-01-19T07:49:45.668" v="311"/>
-        <pc:sldMkLst>
-          <pc:docMk/>
-          <pc:sldMk cId="2304337233" sldId="266"/>
-        </pc:sldMkLst>
-      </pc:sldChg>
-      <pc:sldChg chg="modNotes">
-        <pc:chgData name="Tomer Avishar" userId="S::tomerav@sela.co.il::6f99e47e-5b46-447c-a55a-283bba137982" providerId="AD" clId="Web-{18518D72-659F-BC1B-1C5D-4788DBEB738E}" dt="2022-01-19T07:50:05.028" v="314"/>
-        <pc:sldMkLst>
-          <pc:docMk/>
-          <pc:sldMk cId="715340640" sldId="267"/>
-        </pc:sldMkLst>
-      </pc:sldChg>
-      <pc:sldChg chg="modSp modNotes">
-        <pc:chgData name="Tomer Avishar" userId="S::tomerav@sela.co.il::6f99e47e-5b46-447c-a55a-283bba137982" providerId="AD" clId="Web-{18518D72-659F-BC1B-1C5D-4788DBEB738E}" dt="2022-01-19T07:50:33.622" v="316" actId="14100"/>
-        <pc:sldMkLst>
-          <pc:docMk/>
-          <pc:sldMk cId="2689029024" sldId="270"/>
-        </pc:sldMkLst>
-        <pc:picChg chg="mod">
-          <ac:chgData name="Tomer Avishar" userId="S::tomerav@sela.co.il::6f99e47e-5b46-447c-a55a-283bba137982" providerId="AD" clId="Web-{18518D72-659F-BC1B-1C5D-4788DBEB738E}" dt="2022-01-19T07:50:33.622" v="316" actId="14100"/>
-          <ac:picMkLst>
-            <pc:docMk/>
-            <pc:sldMk cId="2689029024" sldId="270"/>
-            <ac:picMk id="5" creationId="{CB94E144-CDD6-4E31-BD08-A4728824C2AC}"/>
-          </ac:picMkLst>
-        </pc:picChg>
-      </pc:sldChg>
-      <pc:sldChg chg="modNotes">
-        <pc:chgData name="Tomer Avishar" userId="S::tomerav@sela.co.il::6f99e47e-5b46-447c-a55a-283bba137982" providerId="AD" clId="Web-{18518D72-659F-BC1B-1C5D-4788DBEB738E}" dt="2022-01-19T08:00:08.652" v="659"/>
-        <pc:sldMkLst>
-          <pc:docMk/>
-          <pc:sldMk cId="3214580080" sldId="271"/>
-        </pc:sldMkLst>
-      </pc:sldChg>
-      <pc:sldChg chg="modSp modNotes">
-        <pc:chgData name="Tomer Avishar" userId="S::tomerav@sela.co.il::6f99e47e-5b46-447c-a55a-283bba137982" providerId="AD" clId="Web-{18518D72-659F-BC1B-1C5D-4788DBEB738E}" dt="2022-01-19T08:35:01.101" v="983"/>
-        <pc:sldMkLst>
-          <pc:docMk/>
-          <pc:sldMk cId="836256761" sldId="273"/>
-        </pc:sldMkLst>
-        <pc:spChg chg="mod">
-          <ac:chgData name="Tomer Avishar" userId="S::tomerav@sela.co.il::6f99e47e-5b46-447c-a55a-283bba137982" providerId="AD" clId="Web-{18518D72-659F-BC1B-1C5D-4788DBEB738E}" dt="2022-01-19T08:29:33.221" v="665" actId="1076"/>
-          <ac:spMkLst>
-            <pc:docMk/>
-            <pc:sldMk cId="836256761" sldId="273"/>
-            <ac:spMk id="33" creationId="{D02A888E-5FC8-4540-8F3B-D8914D030D17}"/>
-          </ac:spMkLst>
-        </pc:spChg>
-        <pc:spChg chg="mod">
-          <ac:chgData name="Tomer Avishar" userId="S::tomerav@sela.co.il::6f99e47e-5b46-447c-a55a-283bba137982" providerId="AD" clId="Web-{18518D72-659F-BC1B-1C5D-4788DBEB738E}" dt="2022-01-19T08:30:39.835" v="678" actId="1076"/>
-          <ac:spMkLst>
-            <pc:docMk/>
-            <pc:sldMk cId="836256761" sldId="273"/>
-            <ac:spMk id="47" creationId="{00000000-0000-0000-0000-000000000000}"/>
-          </ac:spMkLst>
-        </pc:spChg>
-        <pc:spChg chg="mod">
-          <ac:chgData name="Tomer Avishar" userId="S::tomerav@sela.co.il::6f99e47e-5b46-447c-a55a-283bba137982" providerId="AD" clId="Web-{18518D72-659F-BC1B-1C5D-4788DBEB738E}" dt="2022-01-19T08:30:23.974" v="674" actId="14100"/>
-          <ac:spMkLst>
-            <pc:docMk/>
-            <pc:sldMk cId="836256761" sldId="273"/>
-            <ac:spMk id="48" creationId="{00000000-0000-0000-0000-000000000000}"/>
-          </ac:spMkLst>
-        </pc:spChg>
-        <pc:spChg chg="mod">
-          <ac:chgData name="Tomer Avishar" userId="S::tomerav@sela.co.il::6f99e47e-5b46-447c-a55a-283bba137982" providerId="AD" clId="Web-{18518D72-659F-BC1B-1C5D-4788DBEB738E}" dt="2022-01-19T08:29:50.034" v="667" actId="1076"/>
-          <ac:spMkLst>
-            <pc:docMk/>
-            <pc:sldMk cId="836256761" sldId="273"/>
-            <ac:spMk id="51" creationId="{00000000-0000-0000-0000-000000000000}"/>
-          </ac:spMkLst>
-        </pc:spChg>
-        <pc:spChg chg="mod">
-          <ac:chgData name="Tomer Avishar" userId="S::tomerav@sela.co.il::6f99e47e-5b46-447c-a55a-283bba137982" providerId="AD" clId="Web-{18518D72-659F-BC1B-1C5D-4788DBEB738E}" dt="2022-01-19T08:30:32.162" v="676" actId="1076"/>
-          <ac:spMkLst>
-            <pc:docMk/>
-            <pc:sldMk cId="836256761" sldId="273"/>
-            <ac:spMk id="52" creationId="{00000000-0000-0000-0000-000000000000}"/>
-          </ac:spMkLst>
-        </pc:spChg>
-        <pc:grpChg chg="mod">
-          <ac:chgData name="Tomer Avishar" userId="S::tomerav@sela.co.il::6f99e47e-5b46-447c-a55a-283bba137982" providerId="AD" clId="Web-{18518D72-659F-BC1B-1C5D-4788DBEB738E}" dt="2022-01-19T08:29:45.753" v="666" actId="1076"/>
-          <ac:grpSpMkLst>
-            <pc:docMk/>
-            <pc:sldMk cId="836256761" sldId="273"/>
-            <ac:grpSpMk id="61" creationId="{00000000-0000-0000-0000-000000000000}"/>
-          </ac:grpSpMkLst>
-        </pc:grpChg>
-        <pc:picChg chg="mod">
-          <ac:chgData name="Tomer Avishar" userId="S::tomerav@sela.co.il::6f99e47e-5b46-447c-a55a-283bba137982" providerId="AD" clId="Web-{18518D72-659F-BC1B-1C5D-4788DBEB738E}" dt="2022-01-19T08:29:17.782" v="662" actId="14100"/>
-          <ac:picMkLst>
-            <pc:docMk/>
-            <pc:sldMk cId="836256761" sldId="273"/>
-            <ac:picMk id="5" creationId="{EB4C8E04-D222-424F-B1D9-E4EFBA7C804A}"/>
-          </ac:picMkLst>
-        </pc:picChg>
-        <pc:cxnChg chg="mod">
-          <ac:chgData name="Tomer Avishar" userId="S::tomerav@sela.co.il::6f99e47e-5b46-447c-a55a-283bba137982" providerId="AD" clId="Web-{18518D72-659F-BC1B-1C5D-4788DBEB738E}" dt="2022-01-19T08:29:33.221" v="665" actId="1076"/>
-          <ac:cxnSpMkLst>
-            <pc:docMk/>
-            <pc:sldMk cId="836256761" sldId="273"/>
-            <ac:cxnSpMk id="34" creationId="{630AC0C4-7B96-4287-9C2B-D0D3666BB022}"/>
-          </ac:cxnSpMkLst>
-        </pc:cxnChg>
-        <pc:cxnChg chg="mod">
-          <ac:chgData name="Tomer Avishar" userId="S::tomerav@sela.co.il::6f99e47e-5b46-447c-a55a-283bba137982" providerId="AD" clId="Web-{18518D72-659F-BC1B-1C5D-4788DBEB738E}" dt="2022-01-19T08:29:58.582" v="669" actId="14100"/>
-          <ac:cxnSpMkLst>
-            <pc:docMk/>
-            <pc:sldMk cId="836256761" sldId="273"/>
-            <ac:cxnSpMk id="55" creationId="{00000000-0000-0000-0000-000000000000}"/>
-          </ac:cxnSpMkLst>
-        </pc:cxnChg>
-        <pc:cxnChg chg="mod">
-          <ac:chgData name="Tomer Avishar" userId="S::tomerav@sela.co.il::6f99e47e-5b46-447c-a55a-283bba137982" providerId="AD" clId="Web-{18518D72-659F-BC1B-1C5D-4788DBEB738E}" dt="2022-01-19T08:30:35.412" v="677" actId="14100"/>
-          <ac:cxnSpMkLst>
-            <pc:docMk/>
-            <pc:sldMk cId="836256761" sldId="273"/>
-            <ac:cxnSpMk id="56" creationId="{00000000-0000-0000-0000-000000000000}"/>
-          </ac:cxnSpMkLst>
-        </pc:cxnChg>
-        <pc:cxnChg chg="mod">
-          <ac:chgData name="Tomer Avishar" userId="S::tomerav@sela.co.il::6f99e47e-5b46-447c-a55a-283bba137982" providerId="AD" clId="Web-{18518D72-659F-BC1B-1C5D-4788DBEB738E}" dt="2022-01-19T08:30:28.865" v="675" actId="14100"/>
-          <ac:cxnSpMkLst>
-            <pc:docMk/>
-            <pc:sldMk cId="836256761" sldId="273"/>
-            <ac:cxnSpMk id="57" creationId="{00000000-0000-0000-0000-000000000000}"/>
-          </ac:cxnSpMkLst>
-        </pc:cxnChg>
-        <pc:cxnChg chg="mod">
-          <ac:chgData name="Tomer Avishar" userId="S::tomerav@sela.co.il::6f99e47e-5b46-447c-a55a-283bba137982" providerId="AD" clId="Web-{18518D72-659F-BC1B-1C5D-4788DBEB738E}" dt="2022-01-19T08:30:43.553" v="679" actId="14100"/>
-          <ac:cxnSpMkLst>
-            <pc:docMk/>
-            <pc:sldMk cId="836256761" sldId="273"/>
-            <ac:cxnSpMk id="60" creationId="{00000000-0000-0000-0000-000000000000}"/>
-          </ac:cxnSpMkLst>
-        </pc:cxnChg>
-      </pc:sldChg>
-      <pc:sldChg chg="modNotes">
-        <pc:chgData name="Tomer Avishar" userId="S::tomerav@sela.co.il::6f99e47e-5b46-447c-a55a-283bba137982" providerId="AD" clId="Web-{18518D72-659F-BC1B-1C5D-4788DBEB738E}" dt="2022-01-19T08:46:13.847" v="1228"/>
-        <pc:sldMkLst>
-          <pc:docMk/>
-          <pc:sldMk cId="1380134214" sldId="309"/>
-        </pc:sldMkLst>
-      </pc:sldChg>
-    </pc:docChg>
-  </pc:docChgLst>
-  <pc:docChgLst>
-    <pc:chgData name="Tomer Avishar" userId="S::tomerav@sela.co.il::6f99e47e-5b46-447c-a55a-283bba137982" providerId="AD" clId="Web-{1DC4A7C7-CE4F-3205-974E-8156ED17CB91}"/>
-    <pc:docChg chg="modSld">
-      <pc:chgData name="Tomer Avishar" userId="S::tomerav@sela.co.il::6f99e47e-5b46-447c-a55a-283bba137982" providerId="AD" clId="Web-{1DC4A7C7-CE4F-3205-974E-8156ED17CB91}" dt="2022-01-16T14:59:56.065" v="0"/>
-      <pc:docMkLst>
-        <pc:docMk/>
-      </pc:docMkLst>
-      <pc:sldChg chg="addSp">
-        <pc:chgData name="Tomer Avishar" userId="S::tomerav@sela.co.il::6f99e47e-5b46-447c-a55a-283bba137982" providerId="AD" clId="Web-{1DC4A7C7-CE4F-3205-974E-8156ED17CB91}" dt="2022-01-16T14:59:56.065" v="0"/>
-        <pc:sldMkLst>
-          <pc:docMk/>
-          <pc:sldMk cId="715340640" sldId="267"/>
-        </pc:sldMkLst>
-        <pc:spChg chg="add">
-          <ac:chgData name="Tomer Avishar" userId="S::tomerav@sela.co.il::6f99e47e-5b46-447c-a55a-283bba137982" providerId="AD" clId="Web-{1DC4A7C7-CE4F-3205-974E-8156ED17CB91}" dt="2022-01-16T14:59:56.065" v="0"/>
-          <ac:spMkLst>
-            <pc:docMk/>
-            <pc:sldMk cId="715340640" sldId="267"/>
-            <ac:spMk id="4" creationId="{BB2FB569-B4F9-42D8-84FB-8F12F35F05FF}"/>
-          </ac:spMkLst>
-        </pc:spChg>
-      </pc:sldChg>
-    </pc:docChg>
-  </pc:docChgLst>
-  <pc:docChgLst>
-    <pc:chgData name="Tomer Avishar" userId="S::tomerav@sela.co.il::6f99e47e-5b46-447c-a55a-283bba137982" providerId="AD" clId="Web-{D330ABF8-AE4D-B4F8-FC89-666F486D5107}"/>
-    <pc:docChg chg="delSld modSld">
-      <pc:chgData name="Tomer Avishar" userId="S::tomerav@sela.co.il::6f99e47e-5b46-447c-a55a-283bba137982" providerId="AD" clId="Web-{D330ABF8-AE4D-B4F8-FC89-666F486D5107}" dt="2022-01-16T12:14:55.699" v="13" actId="20577"/>
-      <pc:docMkLst>
-        <pc:docMk/>
-      </pc:docMkLst>
-      <pc:sldChg chg="modSp">
-        <pc:chgData name="Tomer Avishar" userId="S::tomerav@sela.co.il::6f99e47e-5b46-447c-a55a-283bba137982" providerId="AD" clId="Web-{D330ABF8-AE4D-B4F8-FC89-666F486D5107}" dt="2022-01-16T12:13:38.369" v="0" actId="14100"/>
-        <pc:sldMkLst>
-          <pc:docMk/>
-          <pc:sldMk cId="2492001281" sldId="280"/>
-        </pc:sldMkLst>
-        <pc:spChg chg="mod">
-          <ac:chgData name="Tomer Avishar" userId="S::tomerav@sela.co.il::6f99e47e-5b46-447c-a55a-283bba137982" providerId="AD" clId="Web-{D330ABF8-AE4D-B4F8-FC89-666F486D5107}" dt="2022-01-16T12:13:38.369" v="0" actId="14100"/>
-          <ac:spMkLst>
-            <pc:docMk/>
-            <pc:sldMk cId="2492001281" sldId="280"/>
-            <ac:spMk id="13" creationId="{F3BD2BD0-202C-40FC-8573-610EE63FC528}"/>
-          </ac:spMkLst>
-        </pc:spChg>
-      </pc:sldChg>
-      <pc:sldChg chg="delCm">
-        <pc:chgData name="Tomer Avishar" userId="S::tomerav@sela.co.il::6f99e47e-5b46-447c-a55a-283bba137982" providerId="AD" clId="Web-{D330ABF8-AE4D-B4F8-FC89-666F486D5107}" dt="2022-01-16T12:13:49.713" v="1"/>
-        <pc:sldMkLst>
-          <pc:docMk/>
-          <pc:sldMk cId="2767821557" sldId="294"/>
-        </pc:sldMkLst>
-      </pc:sldChg>
-      <pc:sldChg chg="del delCm">
-        <pc:chgData name="Tomer Avishar" userId="S::tomerav@sela.co.il::6f99e47e-5b46-447c-a55a-283bba137982" providerId="AD" clId="Web-{D330ABF8-AE4D-B4F8-FC89-666F486D5107}" dt="2022-01-16T12:14:14.089" v="3"/>
-        <pc:sldMkLst>
-          <pc:docMk/>
-          <pc:sldMk cId="2746262724" sldId="295"/>
-        </pc:sldMkLst>
-      </pc:sldChg>
-      <pc:sldChg chg="modSp">
-        <pc:chgData name="Tomer Avishar" userId="S::tomerav@sela.co.il::6f99e47e-5b46-447c-a55a-283bba137982" providerId="AD" clId="Web-{D330ABF8-AE4D-B4F8-FC89-666F486D5107}" dt="2022-01-16T12:14:55.699" v="13" actId="20577"/>
-        <pc:sldMkLst>
-          <pc:docMk/>
-          <pc:sldMk cId="1380134214" sldId="309"/>
-        </pc:sldMkLst>
-        <pc:spChg chg="mod">
-          <ac:chgData name="Tomer Avishar" userId="S::tomerav@sela.co.il::6f99e47e-5b46-447c-a55a-283bba137982" providerId="AD" clId="Web-{D330ABF8-AE4D-B4F8-FC89-666F486D5107}" dt="2022-01-16T12:14:55.699" v="13" actId="20577"/>
-          <ac:spMkLst>
-            <pc:docMk/>
-            <pc:sldMk cId="1380134214" sldId="309"/>
-            <ac:spMk id="6" creationId="{74F98662-678E-4B15-8F4B-F2B687111016}"/>
-          </ac:spMkLst>
-        </pc:spChg>
-      </pc:sldChg>
-    </pc:docChg>
-  </pc:docChgLst>
-  <pc:docChgLst>
-    <pc:chgData clId="Web-{1DC4A7C7-CE4F-3205-974E-8156ED17CB91}"/>
-    <pc:docChg chg="modSld">
-      <pc:chgData name="" userId="" providerId="" clId="Web-{1DC4A7C7-CE4F-3205-974E-8156ED17CB91}" dt="2022-01-16T14:59:31.361" v="0"/>
-      <pc:docMkLst>
-        <pc:docMk/>
-      </pc:docMkLst>
-      <pc:sldChg chg="addSp">
-        <pc:chgData name="" userId="" providerId="" clId="Web-{1DC4A7C7-CE4F-3205-974E-8156ED17CB91}" dt="2022-01-16T14:59:31.361" v="0"/>
-        <pc:sldMkLst>
-          <pc:docMk/>
-          <pc:sldMk cId="1629193451" sldId="257"/>
-        </pc:sldMkLst>
-        <pc:spChg chg="add">
-          <ac:chgData name="" userId="" providerId="" clId="Web-{1DC4A7C7-CE4F-3205-974E-8156ED17CB91}" dt="2022-01-16T14:59:31.361" v="0"/>
-          <ac:spMkLst>
-            <pc:docMk/>
-            <pc:sldMk cId="1629193451" sldId="257"/>
-            <ac:spMk id="3" creationId="{14FB7C35-71DA-4678-A4BC-B36886A75DA8}"/>
-          </ac:spMkLst>
-        </pc:spChg>
-      </pc:sldChg>
-    </pc:docChg>
-  </pc:docChgLst>
 </pc:chgInfo>
 </file>
 
@@ -763,7 +920,7 @@
           <a:p>
             <a:fld id="{81043921-7569-41A3-B947-8944ED878C50}" type="datetimeFigureOut">
               <a:rPr lang="he-IL" smtClean="0"/>
-              <a:t>ה'/תמוז/תשפ"ג</a:t>
+              <a:t>ח'/תמוז/תשפ"ג</a:t>
             </a:fld>
             <a:endParaRPr lang="he-IL"/>
           </a:p>
@@ -2579,7 +2736,7 @@
     </p:spTree>
     <p:extLst>
       <p:ext uri="{BB962C8B-B14F-4D97-AF65-F5344CB8AC3E}">
-        <p14:creationId xmlns:p14="http://schemas.microsoft.com/office/powerpoint/2010/main" val="2528611678"/>
+        <p14:creationId xmlns:p14="http://schemas.microsoft.com/office/powerpoint/2010/main" val="1096976478"/>
       </p:ext>
     </p:extLst>
   </p:cSld>
@@ -2663,6 +2820,282 @@
               <a:rPr lang="en-US" smtClean="0"/>
               <a:pPr/>
               <a:t>26</a:t>
+            </a:fld>
+            <a:endParaRPr lang="en-US"/>
+          </a:p>
+        </p:txBody>
+      </p:sp>
+    </p:spTree>
+    <p:extLst>
+      <p:ext uri="{BB962C8B-B14F-4D97-AF65-F5344CB8AC3E}">
+        <p14:creationId xmlns:p14="http://schemas.microsoft.com/office/powerpoint/2010/main" val="3707584593"/>
+      </p:ext>
+    </p:extLst>
+  </p:cSld>
+  <p:clrMapOvr>
+    <a:masterClrMapping/>
+  </p:clrMapOvr>
+</p:notes>
+</file>
+
+<file path=ppt/notesSlides/notesSlide23.xml><?xml version="1.0" encoding="utf-8"?>
+<p:notes xmlns:a="http://schemas.openxmlformats.org/drawingml/2006/main" xmlns:r="http://schemas.openxmlformats.org/officeDocument/2006/relationships" xmlns:p="http://schemas.openxmlformats.org/presentationml/2006/main">
+  <p:cSld>
+    <p:spTree>
+      <p:nvGrpSpPr>
+        <p:cNvPr id="1" name=""/>
+        <p:cNvGrpSpPr/>
+        <p:nvPr/>
+      </p:nvGrpSpPr>
+      <p:grpSpPr>
+        <a:xfrm>
+          <a:off x="0" y="0"/>
+          <a:ext cx="0" cy="0"/>
+          <a:chOff x="0" y="0"/>
+          <a:chExt cx="0" cy="0"/>
+        </a:xfrm>
+      </p:grpSpPr>
+      <p:sp>
+        <p:nvSpPr>
+          <p:cNvPr id="2" name="Slide Image Placeholder 1"/>
+          <p:cNvSpPr>
+            <a:spLocks noGrp="1" noRot="1" noChangeAspect="1"/>
+          </p:cNvSpPr>
+          <p:nvPr>
+            <p:ph type="sldImg"/>
+          </p:nvPr>
+        </p:nvSpPr>
+        <p:spPr/>
+      </p:sp>
+      <p:sp>
+        <p:nvSpPr>
+          <p:cNvPr id="3" name="Notes Placeholder 2"/>
+          <p:cNvSpPr>
+            <a:spLocks noGrp="1"/>
+          </p:cNvSpPr>
+          <p:nvPr>
+            <p:ph type="body" idx="1"/>
+          </p:nvPr>
+        </p:nvSpPr>
+        <p:spPr/>
+        <p:txBody>
+          <a:bodyPr/>
+          <a:lstStyle/>
+          <a:p>
+            <a:pPr algn="l" rtl="0" eaLnBrk="1" hangingPunct="1">
+              <a:lnSpc>
+                <a:spcPct val="80000"/>
+              </a:lnSpc>
+            </a:pPr>
+            <a:endParaRPr lang="en-US" dirty="0">
+              <a:cs typeface="Calibri"/>
+            </a:endParaRPr>
+          </a:p>
+        </p:txBody>
+      </p:sp>
+      <p:sp>
+        <p:nvSpPr>
+          <p:cNvPr id="4" name="Slide Number Placeholder 3"/>
+          <p:cNvSpPr>
+            <a:spLocks noGrp="1"/>
+          </p:cNvSpPr>
+          <p:nvPr>
+            <p:ph type="sldNum" sz="quarter" idx="10"/>
+          </p:nvPr>
+        </p:nvSpPr>
+        <p:spPr/>
+        <p:txBody>
+          <a:bodyPr/>
+          <a:lstStyle/>
+          <a:p>
+            <a:fld id="{C18343ED-3762-4D46-A439-B4D407E13EF8}" type="slidenum">
+              <a:rPr lang="en-US" smtClean="0"/>
+              <a:pPr/>
+              <a:t>28</a:t>
+            </a:fld>
+            <a:endParaRPr lang="en-US"/>
+          </a:p>
+        </p:txBody>
+      </p:sp>
+    </p:spTree>
+    <p:extLst>
+      <p:ext uri="{BB962C8B-B14F-4D97-AF65-F5344CB8AC3E}">
+        <p14:creationId xmlns:p14="http://schemas.microsoft.com/office/powerpoint/2010/main" val="3481021232"/>
+      </p:ext>
+    </p:extLst>
+  </p:cSld>
+  <p:clrMapOvr>
+    <a:masterClrMapping/>
+  </p:clrMapOvr>
+</p:notes>
+</file>
+
+<file path=ppt/notesSlides/notesSlide24.xml><?xml version="1.0" encoding="utf-8"?>
+<p:notes xmlns:a="http://schemas.openxmlformats.org/drawingml/2006/main" xmlns:r="http://schemas.openxmlformats.org/officeDocument/2006/relationships" xmlns:p="http://schemas.openxmlformats.org/presentationml/2006/main">
+  <p:cSld>
+    <p:spTree>
+      <p:nvGrpSpPr>
+        <p:cNvPr id="1" name=""/>
+        <p:cNvGrpSpPr/>
+        <p:nvPr/>
+      </p:nvGrpSpPr>
+      <p:grpSpPr>
+        <a:xfrm>
+          <a:off x="0" y="0"/>
+          <a:ext cx="0" cy="0"/>
+          <a:chOff x="0" y="0"/>
+          <a:chExt cx="0" cy="0"/>
+        </a:xfrm>
+      </p:grpSpPr>
+      <p:sp>
+        <p:nvSpPr>
+          <p:cNvPr id="2" name="Slide Image Placeholder 1"/>
+          <p:cNvSpPr>
+            <a:spLocks noGrp="1" noRot="1" noChangeAspect="1"/>
+          </p:cNvSpPr>
+          <p:nvPr>
+            <p:ph type="sldImg"/>
+          </p:nvPr>
+        </p:nvSpPr>
+        <p:spPr/>
+      </p:sp>
+      <p:sp>
+        <p:nvSpPr>
+          <p:cNvPr id="3" name="Notes Placeholder 2"/>
+          <p:cNvSpPr>
+            <a:spLocks noGrp="1"/>
+          </p:cNvSpPr>
+          <p:nvPr>
+            <p:ph type="body" idx="1"/>
+          </p:nvPr>
+        </p:nvSpPr>
+        <p:spPr/>
+        <p:txBody>
+          <a:bodyPr/>
+          <a:lstStyle/>
+          <a:p>
+            <a:pPr algn="l" rtl="0" eaLnBrk="1" hangingPunct="1">
+              <a:lnSpc>
+                <a:spcPct val="80000"/>
+              </a:lnSpc>
+            </a:pPr>
+            <a:endParaRPr lang="en-US" dirty="0">
+              <a:cs typeface="Calibri"/>
+            </a:endParaRPr>
+          </a:p>
+        </p:txBody>
+      </p:sp>
+      <p:sp>
+        <p:nvSpPr>
+          <p:cNvPr id="4" name="Slide Number Placeholder 3"/>
+          <p:cNvSpPr>
+            <a:spLocks noGrp="1"/>
+          </p:cNvSpPr>
+          <p:nvPr>
+            <p:ph type="sldNum" sz="quarter" idx="10"/>
+          </p:nvPr>
+        </p:nvSpPr>
+        <p:spPr/>
+        <p:txBody>
+          <a:bodyPr/>
+          <a:lstStyle/>
+          <a:p>
+            <a:fld id="{C18343ED-3762-4D46-A439-B4D407E13EF8}" type="slidenum">
+              <a:rPr lang="en-US" smtClean="0"/>
+              <a:pPr/>
+              <a:t>29</a:t>
+            </a:fld>
+            <a:endParaRPr lang="en-US"/>
+          </a:p>
+        </p:txBody>
+      </p:sp>
+    </p:spTree>
+    <p:extLst>
+      <p:ext uri="{BB962C8B-B14F-4D97-AF65-F5344CB8AC3E}">
+        <p14:creationId xmlns:p14="http://schemas.microsoft.com/office/powerpoint/2010/main" val="2528611678"/>
+      </p:ext>
+    </p:extLst>
+  </p:cSld>
+  <p:clrMapOvr>
+    <a:masterClrMapping/>
+  </p:clrMapOvr>
+</p:notes>
+</file>
+
+<file path=ppt/notesSlides/notesSlide25.xml><?xml version="1.0" encoding="utf-8"?>
+<p:notes xmlns:a="http://schemas.openxmlformats.org/drawingml/2006/main" xmlns:r="http://schemas.openxmlformats.org/officeDocument/2006/relationships" xmlns:p="http://schemas.openxmlformats.org/presentationml/2006/main">
+  <p:cSld>
+    <p:spTree>
+      <p:nvGrpSpPr>
+        <p:cNvPr id="1" name=""/>
+        <p:cNvGrpSpPr/>
+        <p:nvPr/>
+      </p:nvGrpSpPr>
+      <p:grpSpPr>
+        <a:xfrm>
+          <a:off x="0" y="0"/>
+          <a:ext cx="0" cy="0"/>
+          <a:chOff x="0" y="0"/>
+          <a:chExt cx="0" cy="0"/>
+        </a:xfrm>
+      </p:grpSpPr>
+      <p:sp>
+        <p:nvSpPr>
+          <p:cNvPr id="2" name="Slide Image Placeholder 1"/>
+          <p:cNvSpPr>
+            <a:spLocks noGrp="1" noRot="1" noChangeAspect="1"/>
+          </p:cNvSpPr>
+          <p:nvPr>
+            <p:ph type="sldImg"/>
+          </p:nvPr>
+        </p:nvSpPr>
+        <p:spPr/>
+      </p:sp>
+      <p:sp>
+        <p:nvSpPr>
+          <p:cNvPr id="3" name="Notes Placeholder 2"/>
+          <p:cNvSpPr>
+            <a:spLocks noGrp="1"/>
+          </p:cNvSpPr>
+          <p:nvPr>
+            <p:ph type="body" idx="1"/>
+          </p:nvPr>
+        </p:nvSpPr>
+        <p:spPr/>
+        <p:txBody>
+          <a:bodyPr/>
+          <a:lstStyle/>
+          <a:p>
+            <a:pPr algn="l" rtl="0" eaLnBrk="1" hangingPunct="1">
+              <a:lnSpc>
+                <a:spcPct val="80000"/>
+              </a:lnSpc>
+            </a:pPr>
+            <a:endParaRPr lang="en-US" dirty="0">
+              <a:cs typeface="Calibri"/>
+            </a:endParaRPr>
+          </a:p>
+        </p:txBody>
+      </p:sp>
+      <p:sp>
+        <p:nvSpPr>
+          <p:cNvPr id="4" name="Slide Number Placeholder 3"/>
+          <p:cNvSpPr>
+            <a:spLocks noGrp="1"/>
+          </p:cNvSpPr>
+          <p:nvPr>
+            <p:ph type="sldNum" sz="quarter" idx="10"/>
+          </p:nvPr>
+        </p:nvSpPr>
+        <p:spPr/>
+        <p:txBody>
+          <a:bodyPr/>
+          <a:lstStyle/>
+          <a:p>
+            <a:fld id="{C18343ED-3762-4D46-A439-B4D407E13EF8}" type="slidenum">
+              <a:rPr lang="en-US" smtClean="0"/>
+              <a:pPr/>
+              <a:t>30</a:t>
             </a:fld>
             <a:endParaRPr lang="en-US"/>
           </a:p>
@@ -3582,7 +4015,7 @@
           <a:p>
             <a:fld id="{A9D9B7D1-305C-49A9-9D59-000E5D30F1FD}" type="datetimeFigureOut">
               <a:rPr lang="he-IL" smtClean="0"/>
-              <a:t>ה'/תמוז/תשפ"ג</a:t>
+              <a:t>ח'/תמוז/תשפ"ג</a:t>
             </a:fld>
             <a:endParaRPr lang="he-IL"/>
           </a:p>
@@ -3780,7 +4213,7 @@
           <a:p>
             <a:fld id="{A9D9B7D1-305C-49A9-9D59-000E5D30F1FD}" type="datetimeFigureOut">
               <a:rPr lang="he-IL" smtClean="0"/>
-              <a:t>ה'/תמוז/תשפ"ג</a:t>
+              <a:t>ח'/תמוז/תשפ"ג</a:t>
             </a:fld>
             <a:endParaRPr lang="he-IL"/>
           </a:p>
@@ -3988,7 +4421,7 @@
           <a:p>
             <a:fld id="{A9D9B7D1-305C-49A9-9D59-000E5D30F1FD}" type="datetimeFigureOut">
               <a:rPr lang="he-IL" smtClean="0"/>
-              <a:t>ה'/תמוז/תשפ"ג</a:t>
+              <a:t>ח'/תמוז/תשפ"ג</a:t>
             </a:fld>
             <a:endParaRPr lang="he-IL"/>
           </a:p>
@@ -6412,7 +6845,7 @@
           <a:p>
             <a:fld id="{A9D9B7D1-305C-49A9-9D59-000E5D30F1FD}" type="datetimeFigureOut">
               <a:rPr lang="he-IL" smtClean="0"/>
-              <a:t>ה'/תמוז/תשפ"ג</a:t>
+              <a:t>ח'/תמוז/תשפ"ג</a:t>
             </a:fld>
             <a:endParaRPr lang="he-IL"/>
           </a:p>
@@ -6687,7 +7120,7 @@
           <a:p>
             <a:fld id="{A9D9B7D1-305C-49A9-9D59-000E5D30F1FD}" type="datetimeFigureOut">
               <a:rPr lang="he-IL" smtClean="0"/>
-              <a:t>ה'/תמוז/תשפ"ג</a:t>
+              <a:t>ח'/תמוז/תשפ"ג</a:t>
             </a:fld>
             <a:endParaRPr lang="he-IL"/>
           </a:p>
@@ -6952,7 +7385,7 @@
           <a:p>
             <a:fld id="{A9D9B7D1-305C-49A9-9D59-000E5D30F1FD}" type="datetimeFigureOut">
               <a:rPr lang="he-IL" smtClean="0"/>
-              <a:t>ה'/תמוז/תשפ"ג</a:t>
+              <a:t>ח'/תמוז/תשפ"ג</a:t>
             </a:fld>
             <a:endParaRPr lang="he-IL"/>
           </a:p>
@@ -7364,7 +7797,7 @@
           <a:p>
             <a:fld id="{A9D9B7D1-305C-49A9-9D59-000E5D30F1FD}" type="datetimeFigureOut">
               <a:rPr lang="he-IL" smtClean="0"/>
-              <a:t>ה'/תמוז/תשפ"ג</a:t>
+              <a:t>ח'/תמוז/תשפ"ג</a:t>
             </a:fld>
             <a:endParaRPr lang="he-IL"/>
           </a:p>
@@ -7505,7 +7938,7 @@
           <a:p>
             <a:fld id="{A9D9B7D1-305C-49A9-9D59-000E5D30F1FD}" type="datetimeFigureOut">
               <a:rPr lang="he-IL" smtClean="0"/>
-              <a:t>ה'/תמוז/תשפ"ג</a:t>
+              <a:t>ח'/תמוז/תשפ"ג</a:t>
             </a:fld>
             <a:endParaRPr lang="he-IL"/>
           </a:p>
@@ -7618,7 +8051,7 @@
           <a:p>
             <a:fld id="{A9D9B7D1-305C-49A9-9D59-000E5D30F1FD}" type="datetimeFigureOut">
               <a:rPr lang="he-IL" smtClean="0"/>
-              <a:t>ה'/תמוז/תשפ"ג</a:t>
+              <a:t>ח'/תמוז/תשפ"ג</a:t>
             </a:fld>
             <a:endParaRPr lang="he-IL"/>
           </a:p>
@@ -7929,7 +8362,7 @@
           <a:p>
             <a:fld id="{A9D9B7D1-305C-49A9-9D59-000E5D30F1FD}" type="datetimeFigureOut">
               <a:rPr lang="he-IL" smtClean="0"/>
-              <a:t>ה'/תמוז/תשפ"ג</a:t>
+              <a:t>ח'/תמוז/תשפ"ג</a:t>
             </a:fld>
             <a:endParaRPr lang="he-IL"/>
           </a:p>
@@ -8217,7 +8650,7 @@
           <a:p>
             <a:fld id="{A9D9B7D1-305C-49A9-9D59-000E5D30F1FD}" type="datetimeFigureOut">
               <a:rPr lang="he-IL" smtClean="0"/>
-              <a:t>ה'/תמוז/תשפ"ג</a:t>
+              <a:t>ח'/תמוז/תשפ"ג</a:t>
             </a:fld>
             <a:endParaRPr lang="he-IL"/>
           </a:p>
@@ -8458,7 +8891,7 @@
           <a:p>
             <a:fld id="{A9D9B7D1-305C-49A9-9D59-000E5D30F1FD}" type="datetimeFigureOut">
               <a:rPr lang="he-IL" smtClean="0"/>
-              <a:t>ה'/תמוז/תשפ"ג</a:t>
+              <a:t>ח'/תמוז/תשפ"ג</a:t>
             </a:fld>
             <a:endParaRPr lang="he-IL"/>
           </a:p>
@@ -18028,7 +18461,7 @@
               <a:rPr lang="en-US" dirty="0">
                 <a:effectLst/>
               </a:rPr>
-              <a:t>Locating Modules</a:t>
+              <a:t>Init file</a:t>
             </a:r>
             <a:endParaRPr lang="he-IL" dirty="0"/>
           </a:p>
@@ -18052,77 +18485,49 @@
           <a:lstStyle/>
           <a:p>
             <a:r>
-              <a:rPr lang="en-US" dirty="0"/>
-              <a:t>When importing modules the interpreter  searches:</a:t>
-            </a:r>
-          </a:p>
-          <a:p>
-            <a:pPr lvl="1">
-              <a:spcAft>
-                <a:spcPts val="1800"/>
-              </a:spcAft>
-            </a:pPr>
-            <a:r>
-              <a:rPr lang="en-US" dirty="0"/>
-              <a:t>First interpreter searches in the current directory.</a:t>
-            </a:r>
-          </a:p>
-          <a:p>
-            <a:pPr lvl="1">
-              <a:spcAft>
-                <a:spcPts val="1800"/>
-              </a:spcAft>
-            </a:pPr>
-            <a:r>
-              <a:rPr lang="en-US" dirty="0"/>
-              <a:t>If the module isn't found, Python then searches each directory in the shell variable PYTHONPATH</a:t>
-            </a:r>
-          </a:p>
-          <a:p>
-            <a:pPr lvl="1">
-              <a:spcAft>
-                <a:spcPts val="1800"/>
-              </a:spcAft>
-            </a:pPr>
-            <a:r>
-              <a:rPr lang="en-US" dirty="0"/>
-              <a:t>If the module isn’t found, the interpreter searched in standard installation path. (In Linux/Unix for example in /</a:t>
-            </a:r>
-            <a:r>
-              <a:rPr lang="en-US" dirty="0" err="1"/>
-              <a:t>usr</a:t>
-            </a:r>
-            <a:r>
-              <a:rPr lang="en-US" dirty="0"/>
-              <a:t>/local/lib/python)</a:t>
-            </a:r>
-          </a:p>
-          <a:p>
-            <a:pPr lvl="1">
-              <a:spcAft>
-                <a:spcPts val="1800"/>
-              </a:spcAft>
-            </a:pPr>
-            <a:r>
-              <a:rPr lang="en-US" dirty="0"/>
-              <a:t>If the module is not found in any of the above locations, the interpreter raises an “</a:t>
-            </a:r>
-            <a:r>
-              <a:rPr lang="en-US" dirty="0" err="1"/>
-              <a:t>ImportError</a:t>
-            </a:r>
-            <a:r>
-              <a:rPr lang="en-US" dirty="0"/>
-              <a:t>” indicating that the module could not be found.</a:t>
-            </a:r>
-            <a:endParaRPr lang="he-IL" dirty="0"/>
+              <a:rPr lang="en-US" sz="2400" dirty="0"/>
+              <a:t>The __init__.py file, commonly referred to as the "</a:t>
+            </a:r>
+            <a:r>
+              <a:rPr lang="en-US" sz="2400" dirty="0" err="1"/>
+              <a:t>init</a:t>
+            </a:r>
+            <a:r>
+              <a:rPr lang="en-US" sz="2400" dirty="0"/>
+              <a:t> file," is a special file in a Python package that serves as an initializer for the package. It is executed when the package is imported, allowing you to perform necessary setup and define the contents of the package.</a:t>
+            </a:r>
+          </a:p>
+          <a:p>
+            <a:endParaRPr lang="en-US" sz="2400" dirty="0"/>
+          </a:p>
+          <a:p>
+            <a:r>
+              <a:rPr lang="en-US" sz="2400" dirty="0"/>
+              <a:t>In addition to its role as an initializer, the </a:t>
+            </a:r>
+            <a:r>
+              <a:rPr lang="en-US" sz="2400" dirty="0" err="1"/>
+              <a:t>init</a:t>
+            </a:r>
+            <a:r>
+              <a:rPr lang="en-US" sz="2400" dirty="0"/>
+              <a:t> file can also transform a directory into a Python package. Without an </a:t>
+            </a:r>
+            <a:r>
+              <a:rPr lang="en-US" sz="2400" dirty="0" err="1"/>
+              <a:t>init</a:t>
+            </a:r>
+            <a:r>
+              <a:rPr lang="en-US" sz="2400" dirty="0"/>
+              <a:t> file, the directory would simply be treated as a regular folder without any package-specific functionality.</a:t>
+            </a:r>
           </a:p>
         </p:txBody>
       </p:sp>
     </p:spTree>
     <p:extLst>
       <p:ext uri="{BB962C8B-B14F-4D97-AF65-F5344CB8AC3E}">
-        <p14:creationId xmlns:p14="http://schemas.microsoft.com/office/powerpoint/2010/main" val="3629261822"/>
+        <p14:creationId xmlns:p14="http://schemas.microsoft.com/office/powerpoint/2010/main" val="702368095"/>
       </p:ext>
     </p:extLst>
   </p:cSld>
@@ -18167,8 +18572,10 @@
           <a:lstStyle/>
           <a:p>
             <a:r>
-              <a:rPr lang="en-US" dirty="0"/>
-              <a:t>Python packages</a:t>
+              <a:rPr lang="en-US" dirty="0">
+                <a:effectLst/>
+              </a:rPr>
+              <a:t>Init file – cont’d</a:t>
             </a:r>
             <a:endParaRPr lang="he-IL" dirty="0"/>
           </a:p>
@@ -18187,13 +18594,17 @@
         <p:spPr/>
         <p:txBody>
           <a:bodyPr>
-            <a:normAutofit/>
+            <a:normAutofit fontScale="70000" lnSpcReduction="20000"/>
           </a:bodyPr>
           <a:lstStyle/>
           <a:p>
             <a:r>
+              <a:rPr lang="en-US" sz="2400" b="1" dirty="0"/>
+              <a:t>Imports</a:t>
+            </a:r>
+            <a:r>
               <a:rPr lang="en-US" sz="2400" dirty="0"/>
-              <a:t>To help organize modules and provide a naming hierarchy, python has a concept of packages</a:t>
+              <a:t>: You can import other modules or packages that are part of the package. This allows you to organize your code into separate modules and use them within the package.</a:t>
             </a:r>
           </a:p>
           <a:p>
@@ -18201,8 +18612,12 @@
           </a:p>
           <a:p>
             <a:r>
+              <a:rPr lang="en-US" sz="2400" b="1" dirty="0"/>
+              <a:t>Variable and Constant Definitions: </a:t>
+            </a:r>
+            <a:r>
               <a:rPr lang="en-US" sz="2400" dirty="0"/>
-              <a:t>The __init__.py files are required to make Python treat the directories as package</a:t>
+              <a:t>You can initialize variables, constants, or any other objects that will be used by the package. These definitions can be accessed by other modules within the package.</a:t>
             </a:r>
           </a:p>
           <a:p>
@@ -18210,22 +18625,45 @@
           </a:p>
           <a:p>
             <a:r>
+              <a:rPr lang="en-US" sz="2400" b="1" dirty="0"/>
+              <a:t>Function Definitions: </a:t>
+            </a:r>
+            <a:r>
               <a:rPr lang="en-US" sz="2400" dirty="0"/>
-              <a:t>Access to modules inside a package through the full name: </a:t>
-            </a:r>
-            <a:r>
-              <a:rPr lang="en-US" sz="2400" i="1" dirty="0" err="1"/>
-              <a:t>package_name.module_name</a:t>
-            </a:r>
-            <a:endParaRPr lang="en-US" sz="2400" i="1" dirty="0"/>
-          </a:p>
-          <a:p>
-            <a:endParaRPr lang="en-US" sz="2400" i="1" dirty="0"/>
-          </a:p>
-          <a:p>
+              <a:t>You can define functions that are specific to the package or provide utility functions that can be used throughout the package.</a:t>
+            </a:r>
+          </a:p>
+          <a:p>
+            <a:endParaRPr lang="en-US" sz="2400" dirty="0"/>
+          </a:p>
+          <a:p>
+            <a:r>
+              <a:rPr lang="en-US" sz="2400" b="1" dirty="0"/>
+              <a:t>Initialization Code: </a:t>
+            </a:r>
             <a:r>
               <a:rPr lang="en-US" sz="2400" dirty="0"/>
-              <a:t>Packages can contains sub-packages </a:t>
+              <a:t>You can include any necessary initialization code that needs to be executed when the package is imported. This can involve setting up configurations, connecting to databases, or performing any other required setup tasks.</a:t>
+            </a:r>
+          </a:p>
+          <a:p>
+            <a:endParaRPr lang="en-US" sz="2400" dirty="0"/>
+          </a:p>
+          <a:p>
+            <a:pPr marL="0" indent="0">
+              <a:buNone/>
+            </a:pPr>
+            <a:r>
+              <a:rPr lang="en-US" sz="2400" dirty="0"/>
+              <a:t>Overall, the </a:t>
+            </a:r>
+            <a:r>
+              <a:rPr lang="en-US" sz="2400" dirty="0" err="1"/>
+              <a:t>init</a:t>
+            </a:r>
+            <a:r>
+              <a:rPr lang="en-US" sz="2400" dirty="0"/>
+              <a:t> file plays a vital role in structuring and initializing a Python package. It allows you to organize code, define package-level variables and functions, and perform necessary setup operations when the package is imported.</a:t>
             </a:r>
           </a:p>
         </p:txBody>
@@ -18233,7 +18671,7 @@
     </p:spTree>
     <p:extLst>
       <p:ext uri="{BB962C8B-B14F-4D97-AF65-F5344CB8AC3E}">
-        <p14:creationId xmlns:p14="http://schemas.microsoft.com/office/powerpoint/2010/main" val="1171788004"/>
+        <p14:creationId xmlns:p14="http://schemas.microsoft.com/office/powerpoint/2010/main" val="3387540484"/>
       </p:ext>
     </p:extLst>
   </p:cSld>
@@ -18244,59 +18682,6 @@
 </file>
 
 <file path=ppt/slides/slide27.xml><?xml version="1.0" encoding="utf-8"?>
-<p:sld xmlns:a="http://schemas.openxmlformats.org/drawingml/2006/main" xmlns:r="http://schemas.openxmlformats.org/officeDocument/2006/relationships" xmlns:p="http://schemas.openxmlformats.org/presentationml/2006/main">
-  <p:cSld>
-    <p:spTree>
-      <p:nvGrpSpPr>
-        <p:cNvPr id="1" name=""/>
-        <p:cNvGrpSpPr/>
-        <p:nvPr/>
-      </p:nvGrpSpPr>
-      <p:grpSpPr>
-        <a:xfrm>
-          <a:off x="0" y="0"/>
-          <a:ext cx="0" cy="0"/>
-          <a:chOff x="0" y="0"/>
-          <a:chExt cx="0" cy="0"/>
-        </a:xfrm>
-      </p:grpSpPr>
-      <p:sp>
-        <p:nvSpPr>
-          <p:cNvPr id="3" name="Title 2"/>
-          <p:cNvSpPr>
-            <a:spLocks noGrp="1"/>
-          </p:cNvSpPr>
-          <p:nvPr>
-            <p:ph type="title"/>
-          </p:nvPr>
-        </p:nvSpPr>
-        <p:spPr/>
-        <p:txBody>
-          <a:bodyPr/>
-          <a:lstStyle/>
-          <a:p>
-            <a:r>
-              <a:rPr lang="en-US"/>
-              <a:t>Lab 01</a:t>
-            </a:r>
-            <a:endParaRPr lang="he-IL"/>
-          </a:p>
-        </p:txBody>
-      </p:sp>
-    </p:spTree>
-    <p:extLst>
-      <p:ext uri="{BB962C8B-B14F-4D97-AF65-F5344CB8AC3E}">
-        <p14:creationId xmlns:p14="http://schemas.microsoft.com/office/powerpoint/2010/main" val="2767821557"/>
-      </p:ext>
-    </p:extLst>
-  </p:cSld>
-  <p:clrMapOvr>
-    <a:masterClrMapping/>
-  </p:clrMapOvr>
-</p:sld>
-</file>
-
-<file path=ppt/slides/slide28.xml><?xml version="1.0" encoding="utf-8"?>
 <p:sld xmlns:a="http://schemas.openxmlformats.org/drawingml/2006/main" xmlns:r="http://schemas.openxmlformats.org/officeDocument/2006/relationships" xmlns:p="http://schemas.openxmlformats.org/presentationml/2006/main">
   <p:cSld>
     <p:spTree>
@@ -18329,10 +18714,10 @@
           <a:lstStyle/>
           <a:p>
             <a:r>
-              <a:rPr lang="en-US"/>
-              <a:t>Console Methods</a:t>
-            </a:r>
-            <a:endParaRPr lang="he-IL"/>
+              <a:rPr lang="en-US" dirty="0"/>
+              <a:t>Init file </a:t>
+            </a:r>
+            <a:endParaRPr lang="he-IL" dirty="0"/>
           </a:p>
         </p:txBody>
       </p:sp>
@@ -18340,6 +18725,1083 @@
     <p:extLst>
       <p:ext uri="{BB962C8B-B14F-4D97-AF65-F5344CB8AC3E}">
         <p14:creationId xmlns:p14="http://schemas.microsoft.com/office/powerpoint/2010/main" val="3816041889"/>
+      </p:ext>
+    </p:extLst>
+  </p:cSld>
+  <p:clrMapOvr>
+    <a:masterClrMapping/>
+  </p:clrMapOvr>
+</p:sld>
+</file>
+
+<file path=ppt/slides/slide28.xml><?xml version="1.0" encoding="utf-8"?>
+<p:sld xmlns:a="http://schemas.openxmlformats.org/drawingml/2006/main" xmlns:r="http://schemas.openxmlformats.org/officeDocument/2006/relationships" xmlns:p="http://schemas.openxmlformats.org/presentationml/2006/main">
+  <p:cSld>
+    <p:spTree>
+      <p:nvGrpSpPr>
+        <p:cNvPr id="1" name=""/>
+        <p:cNvGrpSpPr/>
+        <p:nvPr/>
+      </p:nvGrpSpPr>
+      <p:grpSpPr>
+        <a:xfrm>
+          <a:off x="0" y="0"/>
+          <a:ext cx="0" cy="0"/>
+          <a:chOff x="0" y="0"/>
+          <a:chExt cx="0" cy="0"/>
+        </a:xfrm>
+      </p:grpSpPr>
+      <p:sp>
+        <p:nvSpPr>
+          <p:cNvPr id="2" name="Title 1"/>
+          <p:cNvSpPr>
+            <a:spLocks noGrp="1"/>
+          </p:cNvSpPr>
+          <p:nvPr>
+            <p:ph type="title"/>
+          </p:nvPr>
+        </p:nvSpPr>
+        <p:spPr/>
+        <p:txBody>
+          <a:bodyPr>
+            <a:normAutofit/>
+          </a:bodyPr>
+          <a:lstStyle/>
+          <a:p>
+            <a:r>
+              <a:rPr lang="en-US" dirty="0">
+                <a:effectLst/>
+              </a:rPr>
+              <a:t>Init file – demo</a:t>
+            </a:r>
+            <a:endParaRPr lang="he-IL" dirty="0"/>
+          </a:p>
+        </p:txBody>
+      </p:sp>
+      <p:sp>
+        <p:nvSpPr>
+          <p:cNvPr id="3" name="Content Placeholder 2"/>
+          <p:cNvSpPr>
+            <a:spLocks noGrp="1"/>
+          </p:cNvSpPr>
+          <p:nvPr>
+            <p:ph idx="1"/>
+          </p:nvPr>
+        </p:nvSpPr>
+        <p:spPr/>
+        <p:txBody>
+          <a:bodyPr>
+            <a:normAutofit/>
+          </a:bodyPr>
+          <a:lstStyle/>
+          <a:p>
+            <a:r>
+              <a:rPr lang="en-US" sz="2400" dirty="0"/>
+              <a:t>__init__.py</a:t>
+            </a:r>
+          </a:p>
+          <a:p>
+            <a:endParaRPr lang="en-US" sz="2400" dirty="0"/>
+          </a:p>
+          <a:p>
+            <a:endParaRPr lang="en-US" sz="2400" dirty="0"/>
+          </a:p>
+          <a:p>
+            <a:r>
+              <a:rPr lang="en-US" sz="2400" dirty="0"/>
+              <a:t>english.py</a:t>
+            </a:r>
+          </a:p>
+          <a:p>
+            <a:endParaRPr lang="en-US" sz="2400" dirty="0"/>
+          </a:p>
+          <a:p>
+            <a:endParaRPr lang="en-US" sz="2400" dirty="0"/>
+          </a:p>
+          <a:p>
+            <a:r>
+              <a:rPr lang="en-US" sz="2400" dirty="0"/>
+              <a:t>spanish.py</a:t>
+            </a:r>
+          </a:p>
+          <a:p>
+            <a:endParaRPr lang="en-US" sz="2400" dirty="0"/>
+          </a:p>
+        </p:txBody>
+      </p:sp>
+      <p:sp>
+        <p:nvSpPr>
+          <p:cNvPr id="4" name="Rectangle 1">
+            <a:extLst>
+              <a:ext uri="{FF2B5EF4-FFF2-40B4-BE49-F238E27FC236}">
+                <a16:creationId xmlns:a16="http://schemas.microsoft.com/office/drawing/2014/main" id="{A85D0F14-442C-49F7-ADFB-99D77B2DDF95}"/>
+              </a:ext>
+            </a:extLst>
+          </p:cNvPr>
+          <p:cNvSpPr>
+            <a:spLocks noChangeArrowheads="1"/>
+          </p:cNvSpPr>
+          <p:nvPr/>
+        </p:nvSpPr>
+        <p:spPr bwMode="auto">
+          <a:xfrm>
+            <a:off x="838200" y="2336568"/>
+            <a:ext cx="4055165" cy="400110"/>
+          </a:xfrm>
+          <a:prstGeom prst="rect">
+            <a:avLst/>
+          </a:prstGeom>
+          <a:solidFill>
+            <a:srgbClr val="2B2B2B"/>
+          </a:solidFill>
+          <a:ln>
+            <a:noFill/>
+          </a:ln>
+          <a:effectLst/>
+          <a:extLst>
+            <a:ext uri="{91240B29-F687-4F45-9708-019B960494DF}">
+              <a14:hiddenLine xmlns:a14="http://schemas.microsoft.com/office/drawing/2010/main" w="9525">
+                <a:solidFill>
+                  <a:schemeClr val="tx1"/>
+                </a:solidFill>
+                <a:miter lim="800000"/>
+                <a:headEnd/>
+                <a:tailEnd/>
+              </a14:hiddenLine>
+            </a:ext>
+            <a:ext uri="{AF507438-7753-43E0-B8FC-AC1667EBCBE1}">
+              <a14:hiddenEffects xmlns:a14="http://schemas.microsoft.com/office/drawing/2010/main">
+                <a:effectLst>
+                  <a:outerShdw dist="35921" dir="2700000" algn="ctr" rotWithShape="0">
+                    <a:schemeClr val="bg2"/>
+                  </a:outerShdw>
+                </a:effectLst>
+              </a14:hiddenEffects>
+            </a:ext>
+          </a:extLst>
+        </p:spPr>
+        <p:txBody>
+          <a:bodyPr vert="horz" wrap="square" lIns="91440" tIns="45720" rIns="91440" bIns="45720" numCol="1" anchor="ctr" anchorCtr="0" compatLnSpc="1">
+            <a:prstTxWarp prst="textNoShape">
+              <a:avLst/>
+            </a:prstTxWarp>
+            <a:spAutoFit/>
+          </a:bodyPr>
+          <a:lstStyle/>
+          <a:p>
+            <a:pPr marL="0" marR="0" lvl="0" indent="0" algn="l" defTabSz="914400" rtl="0" eaLnBrk="0" fontAlgn="base" latinLnBrk="0" hangingPunct="0">
+              <a:lnSpc>
+                <a:spcPct val="100000"/>
+              </a:lnSpc>
+              <a:spcBef>
+                <a:spcPct val="0"/>
+              </a:spcBef>
+              <a:spcAft>
+                <a:spcPct val="0"/>
+              </a:spcAft>
+              <a:buClrTx/>
+              <a:buSzTx/>
+              <a:buFontTx/>
+              <a:buNone/>
+              <a:tabLst/>
+            </a:pPr>
+            <a:r>
+              <a:rPr kumimoji="0" lang="he-IL" altLang="he-IL" sz="1000" b="0" i="0" u="none" strike="noStrike" cap="none" normalizeH="0" baseline="0">
+                <a:ln>
+                  <a:noFill/>
+                </a:ln>
+                <a:solidFill>
+                  <a:srgbClr val="CC7832"/>
+                </a:solidFill>
+                <a:effectLst/>
+                <a:latin typeface="Arial Unicode MS"/>
+              </a:rPr>
+              <a:t>from </a:t>
+            </a:r>
+            <a:r>
+              <a:rPr kumimoji="0" lang="he-IL" altLang="he-IL" sz="1000" b="0" i="0" u="none" strike="noStrike" cap="none" normalizeH="0" baseline="0">
+                <a:ln>
+                  <a:noFill/>
+                </a:ln>
+                <a:solidFill>
+                  <a:srgbClr val="A9B7C6"/>
+                </a:solidFill>
+                <a:effectLst/>
+                <a:latin typeface="Arial Unicode MS"/>
+              </a:rPr>
+              <a:t>.english </a:t>
+            </a:r>
+            <a:r>
+              <a:rPr kumimoji="0" lang="he-IL" altLang="he-IL" sz="1000" b="0" i="0" u="none" strike="noStrike" cap="none" normalizeH="0" baseline="0">
+                <a:ln>
+                  <a:noFill/>
+                </a:ln>
+                <a:solidFill>
+                  <a:srgbClr val="CC7832"/>
+                </a:solidFill>
+                <a:effectLst/>
+                <a:latin typeface="Arial Unicode MS"/>
+              </a:rPr>
+              <a:t>import </a:t>
+            </a:r>
+            <a:r>
+              <a:rPr kumimoji="0" lang="he-IL" altLang="he-IL" sz="1000" b="0" i="0" u="none" strike="noStrike" cap="none" normalizeH="0" baseline="0">
+                <a:ln>
+                  <a:noFill/>
+                </a:ln>
+                <a:solidFill>
+                  <a:srgbClr val="A9B7C6"/>
+                </a:solidFill>
+                <a:effectLst/>
+                <a:latin typeface="Arial Unicode MS"/>
+              </a:rPr>
+              <a:t>say_hello </a:t>
+            </a:r>
+            <a:r>
+              <a:rPr kumimoji="0" lang="he-IL" altLang="he-IL" sz="1000" b="0" i="0" u="none" strike="noStrike" cap="none" normalizeH="0" baseline="0">
+                <a:ln>
+                  <a:noFill/>
+                </a:ln>
+                <a:solidFill>
+                  <a:srgbClr val="CC7832"/>
+                </a:solidFill>
+                <a:effectLst/>
+                <a:latin typeface="Arial Unicode MS"/>
+              </a:rPr>
+              <a:t>as </a:t>
+            </a:r>
+            <a:r>
+              <a:rPr kumimoji="0" lang="he-IL" altLang="he-IL" sz="1000" b="0" i="0" u="none" strike="noStrike" cap="none" normalizeH="0" baseline="0">
+                <a:ln>
+                  <a:noFill/>
+                </a:ln>
+                <a:solidFill>
+                  <a:srgbClr val="A9B7C6"/>
+                </a:solidFill>
+                <a:effectLst/>
+                <a:latin typeface="Arial Unicode MS"/>
+              </a:rPr>
+              <a:t>hello_english</a:t>
+            </a:r>
+            <a:br>
+              <a:rPr kumimoji="0" lang="he-IL" altLang="he-IL" sz="1000" b="0" i="0" u="none" strike="noStrike" cap="none" normalizeH="0" baseline="0">
+                <a:ln>
+                  <a:noFill/>
+                </a:ln>
+                <a:solidFill>
+                  <a:srgbClr val="A9B7C6"/>
+                </a:solidFill>
+                <a:effectLst/>
+                <a:latin typeface="Arial Unicode MS"/>
+              </a:rPr>
+            </a:br>
+            <a:r>
+              <a:rPr kumimoji="0" lang="he-IL" altLang="he-IL" sz="1000" b="0" i="0" u="none" strike="noStrike" cap="none" normalizeH="0" baseline="0">
+                <a:ln>
+                  <a:noFill/>
+                </a:ln>
+                <a:solidFill>
+                  <a:srgbClr val="CC7832"/>
+                </a:solidFill>
+                <a:effectLst/>
+                <a:latin typeface="Arial Unicode MS"/>
+              </a:rPr>
+              <a:t>from </a:t>
+            </a:r>
+            <a:r>
+              <a:rPr kumimoji="0" lang="he-IL" altLang="he-IL" sz="1000" b="0" i="0" u="none" strike="noStrike" cap="none" normalizeH="0" baseline="0">
+                <a:ln>
+                  <a:noFill/>
+                </a:ln>
+                <a:solidFill>
+                  <a:srgbClr val="A9B7C6"/>
+                </a:solidFill>
+                <a:effectLst/>
+                <a:latin typeface="Arial Unicode MS"/>
+              </a:rPr>
+              <a:t>.spanish </a:t>
+            </a:r>
+            <a:r>
+              <a:rPr kumimoji="0" lang="he-IL" altLang="he-IL" sz="1000" b="0" i="0" u="none" strike="noStrike" cap="none" normalizeH="0" baseline="0">
+                <a:ln>
+                  <a:noFill/>
+                </a:ln>
+                <a:solidFill>
+                  <a:srgbClr val="CC7832"/>
+                </a:solidFill>
+                <a:effectLst/>
+                <a:latin typeface="Arial Unicode MS"/>
+              </a:rPr>
+              <a:t>import </a:t>
+            </a:r>
+            <a:r>
+              <a:rPr kumimoji="0" lang="he-IL" altLang="he-IL" sz="1000" b="0" i="0" u="none" strike="noStrike" cap="none" normalizeH="0" baseline="0">
+                <a:ln>
+                  <a:noFill/>
+                </a:ln>
+                <a:solidFill>
+                  <a:srgbClr val="A9B7C6"/>
+                </a:solidFill>
+                <a:effectLst/>
+                <a:latin typeface="Arial Unicode MS"/>
+              </a:rPr>
+              <a:t>say_hello </a:t>
+            </a:r>
+            <a:r>
+              <a:rPr kumimoji="0" lang="he-IL" altLang="he-IL" sz="1000" b="0" i="0" u="none" strike="noStrike" cap="none" normalizeH="0" baseline="0">
+                <a:ln>
+                  <a:noFill/>
+                </a:ln>
+                <a:solidFill>
+                  <a:srgbClr val="CC7832"/>
+                </a:solidFill>
+                <a:effectLst/>
+                <a:latin typeface="Arial Unicode MS"/>
+              </a:rPr>
+              <a:t>as </a:t>
+            </a:r>
+            <a:r>
+              <a:rPr kumimoji="0" lang="he-IL" altLang="he-IL" sz="1000" b="0" i="0" u="none" strike="noStrike" cap="none" normalizeH="0" baseline="0">
+                <a:ln>
+                  <a:noFill/>
+                </a:ln>
+                <a:solidFill>
+                  <a:srgbClr val="A9B7C6"/>
+                </a:solidFill>
+                <a:effectLst/>
+                <a:latin typeface="Arial Unicode MS"/>
+              </a:rPr>
+              <a:t>hello_spanish</a:t>
+            </a:r>
+            <a:endParaRPr kumimoji="0" lang="he-IL" altLang="he-IL" sz="1800" b="0" i="0" u="none" strike="noStrike" cap="none" normalizeH="0" baseline="0">
+              <a:ln>
+                <a:noFill/>
+              </a:ln>
+              <a:solidFill>
+                <a:schemeClr val="tx1"/>
+              </a:solidFill>
+              <a:effectLst/>
+              <a:latin typeface="Arial" panose="020B0604020202020204" pitchFamily="34" charset="0"/>
+            </a:endParaRPr>
+          </a:p>
+        </p:txBody>
+      </p:sp>
+      <p:sp>
+        <p:nvSpPr>
+          <p:cNvPr id="5" name="Rectangle 2">
+            <a:extLst>
+              <a:ext uri="{FF2B5EF4-FFF2-40B4-BE49-F238E27FC236}">
+                <a16:creationId xmlns:a16="http://schemas.microsoft.com/office/drawing/2014/main" id="{82A847D9-4ED2-EE2B-0051-DBD80C0458EC}"/>
+              </a:ext>
+            </a:extLst>
+          </p:cNvPr>
+          <p:cNvSpPr>
+            <a:spLocks noChangeArrowheads="1"/>
+          </p:cNvSpPr>
+          <p:nvPr/>
+        </p:nvSpPr>
+        <p:spPr bwMode="auto">
+          <a:xfrm>
+            <a:off x="838200" y="3684873"/>
+            <a:ext cx="3108960" cy="400110"/>
+          </a:xfrm>
+          <a:prstGeom prst="rect">
+            <a:avLst/>
+          </a:prstGeom>
+          <a:solidFill>
+            <a:srgbClr val="2B2B2B"/>
+          </a:solidFill>
+          <a:ln>
+            <a:noFill/>
+          </a:ln>
+          <a:effectLst/>
+          <a:extLst>
+            <a:ext uri="{91240B29-F687-4F45-9708-019B960494DF}">
+              <a14:hiddenLine xmlns:a14="http://schemas.microsoft.com/office/drawing/2010/main" w="9525">
+                <a:solidFill>
+                  <a:schemeClr val="tx1"/>
+                </a:solidFill>
+                <a:miter lim="800000"/>
+                <a:headEnd/>
+                <a:tailEnd/>
+              </a14:hiddenLine>
+            </a:ext>
+            <a:ext uri="{AF507438-7753-43E0-B8FC-AC1667EBCBE1}">
+              <a14:hiddenEffects xmlns:a14="http://schemas.microsoft.com/office/drawing/2010/main">
+                <a:effectLst>
+                  <a:outerShdw dist="35921" dir="2700000" algn="ctr" rotWithShape="0">
+                    <a:schemeClr val="bg2"/>
+                  </a:outerShdw>
+                </a:effectLst>
+              </a14:hiddenEffects>
+            </a:ext>
+          </a:extLst>
+        </p:spPr>
+        <p:txBody>
+          <a:bodyPr vert="horz" wrap="square" lIns="91440" tIns="45720" rIns="91440" bIns="45720" numCol="1" anchor="ctr" anchorCtr="0" compatLnSpc="1">
+            <a:prstTxWarp prst="textNoShape">
+              <a:avLst/>
+            </a:prstTxWarp>
+            <a:spAutoFit/>
+          </a:bodyPr>
+          <a:lstStyle/>
+          <a:p>
+            <a:pPr marL="0" marR="0" lvl="0" indent="0" algn="l" defTabSz="914400" rtl="0" eaLnBrk="0" fontAlgn="base" latinLnBrk="0" hangingPunct="0">
+              <a:lnSpc>
+                <a:spcPct val="100000"/>
+              </a:lnSpc>
+              <a:spcBef>
+                <a:spcPct val="0"/>
+              </a:spcBef>
+              <a:spcAft>
+                <a:spcPct val="0"/>
+              </a:spcAft>
+              <a:buClrTx/>
+              <a:buSzTx/>
+              <a:buFontTx/>
+              <a:buNone/>
+              <a:tabLst/>
+            </a:pPr>
+            <a:r>
+              <a:rPr kumimoji="0" lang="he-IL" altLang="he-IL" sz="1000" b="0" i="0" u="none" strike="noStrike" cap="none" normalizeH="0" baseline="0" dirty="0" err="1">
+                <a:ln>
+                  <a:noFill/>
+                </a:ln>
+                <a:solidFill>
+                  <a:srgbClr val="CC7832"/>
+                </a:solidFill>
+                <a:effectLst/>
+                <a:latin typeface="Arial Unicode MS"/>
+              </a:rPr>
+              <a:t>def</a:t>
+            </a:r>
+            <a:r>
+              <a:rPr kumimoji="0" lang="he-IL" altLang="he-IL" sz="1000" b="0" i="0" u="none" strike="noStrike" cap="none" normalizeH="0" baseline="0" dirty="0">
+                <a:ln>
+                  <a:noFill/>
+                </a:ln>
+                <a:solidFill>
+                  <a:srgbClr val="CC7832"/>
+                </a:solidFill>
+                <a:effectLst/>
+                <a:latin typeface="Arial Unicode MS"/>
+              </a:rPr>
+              <a:t> </a:t>
+            </a:r>
+            <a:r>
+              <a:rPr kumimoji="0" lang="he-IL" altLang="he-IL" sz="1000" b="0" i="0" u="none" strike="noStrike" cap="none" normalizeH="0" baseline="0" dirty="0" err="1">
+                <a:ln>
+                  <a:noFill/>
+                </a:ln>
+                <a:solidFill>
+                  <a:srgbClr val="A9B7C6"/>
+                </a:solidFill>
+                <a:effectLst/>
+                <a:latin typeface="Arial Unicode MS"/>
+              </a:rPr>
+              <a:t>say_hello</a:t>
+            </a:r>
+            <a:r>
+              <a:rPr kumimoji="0" lang="he-IL" altLang="he-IL" sz="1000" b="0" i="0" u="none" strike="noStrike" cap="none" normalizeH="0" baseline="0" dirty="0">
+                <a:ln>
+                  <a:noFill/>
+                </a:ln>
+                <a:solidFill>
+                  <a:srgbClr val="A9B7C6"/>
+                </a:solidFill>
+                <a:effectLst/>
+                <a:latin typeface="Arial Unicode MS"/>
+              </a:rPr>
+              <a:t>():</a:t>
+            </a:r>
+            <a:br>
+              <a:rPr kumimoji="0" lang="he-IL" altLang="he-IL" sz="1000" b="0" i="0" u="none" strike="noStrike" cap="none" normalizeH="0" baseline="0" dirty="0">
+                <a:ln>
+                  <a:noFill/>
+                </a:ln>
+                <a:solidFill>
+                  <a:srgbClr val="A9B7C6"/>
+                </a:solidFill>
+                <a:effectLst/>
+                <a:latin typeface="Arial Unicode MS"/>
+              </a:rPr>
+            </a:br>
+            <a:r>
+              <a:rPr kumimoji="0" lang="he-IL" altLang="he-IL" sz="1000" b="0" i="0" u="none" strike="noStrike" cap="none" normalizeH="0" baseline="0" dirty="0">
+                <a:ln>
+                  <a:noFill/>
+                </a:ln>
+                <a:solidFill>
+                  <a:srgbClr val="A9B7C6"/>
+                </a:solidFill>
+                <a:effectLst/>
+                <a:latin typeface="Arial Unicode MS"/>
+              </a:rPr>
+              <a:t>    </a:t>
+            </a:r>
+            <a:r>
+              <a:rPr kumimoji="0" lang="he-IL" altLang="he-IL" sz="1000" b="0" i="0" u="none" strike="noStrike" cap="none" normalizeH="0" baseline="0" dirty="0" err="1">
+                <a:ln>
+                  <a:noFill/>
+                </a:ln>
+                <a:solidFill>
+                  <a:srgbClr val="A9B7C6"/>
+                </a:solidFill>
+                <a:effectLst/>
+                <a:latin typeface="Arial Unicode MS"/>
+              </a:rPr>
+              <a:t>print</a:t>
+            </a:r>
+            <a:r>
+              <a:rPr kumimoji="0" lang="he-IL" altLang="he-IL" sz="1000" b="0" i="0" u="none" strike="noStrike" cap="none" normalizeH="0" baseline="0" dirty="0">
+                <a:ln>
+                  <a:noFill/>
+                </a:ln>
+                <a:solidFill>
+                  <a:srgbClr val="A9B7C6"/>
+                </a:solidFill>
+                <a:effectLst/>
+                <a:latin typeface="Arial Unicode MS"/>
+              </a:rPr>
+              <a:t>(</a:t>
+            </a:r>
+            <a:r>
+              <a:rPr kumimoji="0" lang="he-IL" altLang="he-IL" sz="1000" b="0" i="0" u="none" strike="noStrike" cap="none" normalizeH="0" baseline="0" dirty="0">
+                <a:ln>
+                  <a:noFill/>
+                </a:ln>
+                <a:solidFill>
+                  <a:srgbClr val="6A8759"/>
+                </a:solidFill>
+                <a:effectLst/>
+                <a:latin typeface="Arial Unicode MS"/>
+              </a:rPr>
+              <a:t>"</a:t>
+            </a:r>
+            <a:r>
+              <a:rPr kumimoji="0" lang="he-IL" altLang="he-IL" sz="1000" b="0" i="0" u="none" strike="noStrike" cap="none" normalizeH="0" baseline="0" dirty="0" err="1">
+                <a:ln>
+                  <a:noFill/>
+                </a:ln>
+                <a:solidFill>
+                  <a:srgbClr val="6A8759"/>
+                </a:solidFill>
+                <a:effectLst/>
+                <a:latin typeface="Arial Unicode MS"/>
+              </a:rPr>
+              <a:t>Hello</a:t>
+            </a:r>
+            <a:r>
+              <a:rPr kumimoji="0" lang="he-IL" altLang="he-IL" sz="1000" b="0" i="0" u="none" strike="noStrike" cap="none" normalizeH="0" baseline="0" dirty="0">
+                <a:ln>
+                  <a:noFill/>
+                </a:ln>
+                <a:solidFill>
+                  <a:srgbClr val="6A8759"/>
+                </a:solidFill>
+                <a:effectLst/>
+                <a:latin typeface="Arial Unicode MS"/>
+              </a:rPr>
+              <a:t>!"</a:t>
+            </a:r>
+            <a:r>
+              <a:rPr kumimoji="0" lang="he-IL" altLang="he-IL" sz="1000" b="0" i="0" u="none" strike="noStrike" cap="none" normalizeH="0" baseline="0" dirty="0">
+                <a:ln>
+                  <a:noFill/>
+                </a:ln>
+                <a:solidFill>
+                  <a:srgbClr val="A9B7C6"/>
+                </a:solidFill>
+                <a:effectLst/>
+                <a:latin typeface="Arial Unicode MS"/>
+              </a:rPr>
+              <a:t>)</a:t>
+            </a:r>
+            <a:endParaRPr kumimoji="0" lang="he-IL" altLang="he-IL" sz="1800" b="0" i="0" u="none" strike="noStrike" cap="none" normalizeH="0" baseline="0" dirty="0">
+              <a:ln>
+                <a:noFill/>
+              </a:ln>
+              <a:solidFill>
+                <a:schemeClr val="tx1"/>
+              </a:solidFill>
+              <a:effectLst/>
+              <a:latin typeface="Arial" panose="020B0604020202020204" pitchFamily="34" charset="0"/>
+            </a:endParaRPr>
+          </a:p>
+        </p:txBody>
+      </p:sp>
+      <p:sp>
+        <p:nvSpPr>
+          <p:cNvPr id="6" name="Rectangle 3">
+            <a:extLst>
+              <a:ext uri="{FF2B5EF4-FFF2-40B4-BE49-F238E27FC236}">
+                <a16:creationId xmlns:a16="http://schemas.microsoft.com/office/drawing/2014/main" id="{6D563575-3803-076C-98B5-CD348B7CD569}"/>
+              </a:ext>
+            </a:extLst>
+          </p:cNvPr>
+          <p:cNvSpPr>
+            <a:spLocks noChangeArrowheads="1"/>
+          </p:cNvSpPr>
+          <p:nvPr/>
+        </p:nvSpPr>
+        <p:spPr bwMode="auto">
+          <a:xfrm>
+            <a:off x="838200" y="5033178"/>
+            <a:ext cx="2170706" cy="400110"/>
+          </a:xfrm>
+          <a:prstGeom prst="rect">
+            <a:avLst/>
+          </a:prstGeom>
+          <a:solidFill>
+            <a:srgbClr val="2B2B2B"/>
+          </a:solidFill>
+          <a:ln>
+            <a:noFill/>
+          </a:ln>
+          <a:effectLst/>
+          <a:extLst>
+            <a:ext uri="{91240B29-F687-4F45-9708-019B960494DF}">
+              <a14:hiddenLine xmlns:a14="http://schemas.microsoft.com/office/drawing/2010/main" w="9525">
+                <a:solidFill>
+                  <a:schemeClr val="tx1"/>
+                </a:solidFill>
+                <a:miter lim="800000"/>
+                <a:headEnd/>
+                <a:tailEnd/>
+              </a14:hiddenLine>
+            </a:ext>
+            <a:ext uri="{AF507438-7753-43E0-B8FC-AC1667EBCBE1}">
+              <a14:hiddenEffects xmlns:a14="http://schemas.microsoft.com/office/drawing/2010/main">
+                <a:effectLst>
+                  <a:outerShdw dist="35921" dir="2700000" algn="ctr" rotWithShape="0">
+                    <a:schemeClr val="bg2"/>
+                  </a:outerShdw>
+                </a:effectLst>
+              </a14:hiddenEffects>
+            </a:ext>
+          </a:extLst>
+        </p:spPr>
+        <p:txBody>
+          <a:bodyPr vert="horz" wrap="square" lIns="91440" tIns="45720" rIns="91440" bIns="45720" numCol="1" anchor="ctr" anchorCtr="0" compatLnSpc="1">
+            <a:prstTxWarp prst="textNoShape">
+              <a:avLst/>
+            </a:prstTxWarp>
+            <a:spAutoFit/>
+          </a:bodyPr>
+          <a:lstStyle/>
+          <a:p>
+            <a:pPr marL="0" marR="0" lvl="0" indent="0" algn="l" defTabSz="914400" rtl="0" eaLnBrk="0" fontAlgn="base" latinLnBrk="0" hangingPunct="0">
+              <a:lnSpc>
+                <a:spcPct val="100000"/>
+              </a:lnSpc>
+              <a:spcBef>
+                <a:spcPct val="0"/>
+              </a:spcBef>
+              <a:spcAft>
+                <a:spcPct val="0"/>
+              </a:spcAft>
+              <a:buClrTx/>
+              <a:buSzTx/>
+              <a:buFontTx/>
+              <a:buNone/>
+              <a:tabLst/>
+            </a:pPr>
+            <a:r>
+              <a:rPr kumimoji="0" lang="he-IL" altLang="he-IL" sz="1000" b="0" i="0" u="none" strike="noStrike" cap="none" normalizeH="0" baseline="0">
+                <a:ln>
+                  <a:noFill/>
+                </a:ln>
+                <a:solidFill>
+                  <a:srgbClr val="CC7832"/>
+                </a:solidFill>
+                <a:effectLst/>
+                <a:latin typeface="Arial Unicode MS"/>
+              </a:rPr>
+              <a:t>def </a:t>
+            </a:r>
+            <a:r>
+              <a:rPr kumimoji="0" lang="he-IL" altLang="he-IL" sz="1000" b="0" i="0" u="none" strike="noStrike" cap="none" normalizeH="0" baseline="0">
+                <a:ln>
+                  <a:noFill/>
+                </a:ln>
+                <a:solidFill>
+                  <a:srgbClr val="A9B7C6"/>
+                </a:solidFill>
+                <a:effectLst/>
+                <a:latin typeface="Arial Unicode MS"/>
+              </a:rPr>
+              <a:t>say_hello():</a:t>
+            </a:r>
+            <a:br>
+              <a:rPr kumimoji="0" lang="he-IL" altLang="he-IL" sz="1000" b="0" i="0" u="none" strike="noStrike" cap="none" normalizeH="0" baseline="0">
+                <a:ln>
+                  <a:noFill/>
+                </a:ln>
+                <a:solidFill>
+                  <a:srgbClr val="A9B7C6"/>
+                </a:solidFill>
+                <a:effectLst/>
+                <a:latin typeface="Arial Unicode MS"/>
+              </a:rPr>
+            </a:br>
+            <a:r>
+              <a:rPr kumimoji="0" lang="he-IL" altLang="he-IL" sz="1000" b="0" i="0" u="none" strike="noStrike" cap="none" normalizeH="0" baseline="0">
+                <a:ln>
+                  <a:noFill/>
+                </a:ln>
+                <a:solidFill>
+                  <a:srgbClr val="A9B7C6"/>
+                </a:solidFill>
+                <a:effectLst/>
+                <a:latin typeface="Arial Unicode MS"/>
+              </a:rPr>
+              <a:t>    print(</a:t>
+            </a:r>
+            <a:r>
+              <a:rPr kumimoji="0" lang="he-IL" altLang="he-IL" sz="1000" b="0" i="0" u="none" strike="noStrike" cap="none" normalizeH="0" baseline="0">
+                <a:ln>
+                  <a:noFill/>
+                </a:ln>
+                <a:solidFill>
+                  <a:srgbClr val="6A8759"/>
+                </a:solidFill>
+                <a:effectLst/>
+                <a:latin typeface="Arial Unicode MS"/>
+              </a:rPr>
+              <a:t>"¡Hola!"</a:t>
+            </a:r>
+            <a:r>
+              <a:rPr kumimoji="0" lang="he-IL" altLang="he-IL" sz="1000" b="0" i="0" u="none" strike="noStrike" cap="none" normalizeH="0" baseline="0">
+                <a:ln>
+                  <a:noFill/>
+                </a:ln>
+                <a:solidFill>
+                  <a:srgbClr val="A9B7C6"/>
+                </a:solidFill>
+                <a:effectLst/>
+                <a:latin typeface="Arial Unicode MS"/>
+              </a:rPr>
+              <a:t>)</a:t>
+            </a:r>
+            <a:endParaRPr kumimoji="0" lang="he-IL" altLang="he-IL" sz="1800" b="0" i="0" u="none" strike="noStrike" cap="none" normalizeH="0" baseline="0">
+              <a:ln>
+                <a:noFill/>
+              </a:ln>
+              <a:solidFill>
+                <a:schemeClr val="tx1"/>
+              </a:solidFill>
+              <a:effectLst/>
+              <a:latin typeface="Arial" panose="020B0604020202020204" pitchFamily="34" charset="0"/>
+            </a:endParaRPr>
+          </a:p>
+        </p:txBody>
+      </p:sp>
+      <p:sp>
+        <p:nvSpPr>
+          <p:cNvPr id="8" name="תיבת טקסט 7">
+            <a:extLst>
+              <a:ext uri="{FF2B5EF4-FFF2-40B4-BE49-F238E27FC236}">
+                <a16:creationId xmlns:a16="http://schemas.microsoft.com/office/drawing/2014/main" id="{9C77D842-28C8-1066-22D7-AA317B24DD43}"/>
+              </a:ext>
+            </a:extLst>
+          </p:cNvPr>
+          <p:cNvSpPr txBox="1"/>
+          <p:nvPr/>
+        </p:nvSpPr>
+        <p:spPr>
+          <a:xfrm>
+            <a:off x="7299296" y="1815179"/>
+            <a:ext cx="4054503" cy="2585323"/>
+          </a:xfrm>
+          <a:prstGeom prst="rect">
+            <a:avLst/>
+          </a:prstGeom>
+          <a:noFill/>
+        </p:spPr>
+        <p:txBody>
+          <a:bodyPr wrap="square" rtlCol="1">
+            <a:spAutoFit/>
+          </a:bodyPr>
+          <a:lstStyle/>
+          <a:p>
+            <a:r>
+              <a:rPr lang="en-US" dirty="0"/>
+              <a:t>Let's consider a package named greetings, which provides simple greeting functions. We can create the following directory structure:</a:t>
+            </a:r>
+          </a:p>
+          <a:p>
+            <a:endParaRPr lang="en-US" dirty="0"/>
+          </a:p>
+          <a:p>
+            <a:r>
+              <a:rPr lang="en-US" dirty="0"/>
+              <a:t>greetings/</a:t>
+            </a:r>
+          </a:p>
+          <a:p>
+            <a:r>
+              <a:rPr lang="en-US" dirty="0"/>
+              <a:t>    __init__.py</a:t>
+            </a:r>
+          </a:p>
+          <a:p>
+            <a:r>
+              <a:rPr lang="en-US" dirty="0"/>
+              <a:t>    english.py</a:t>
+            </a:r>
+          </a:p>
+          <a:p>
+            <a:r>
+              <a:rPr lang="en-US" dirty="0"/>
+              <a:t>    spanish.py</a:t>
+            </a:r>
+            <a:endParaRPr lang="he-IL" dirty="0"/>
+          </a:p>
+        </p:txBody>
+      </p:sp>
+      <p:sp>
+        <p:nvSpPr>
+          <p:cNvPr id="11" name="Rectangle 4">
+            <a:extLst>
+              <a:ext uri="{FF2B5EF4-FFF2-40B4-BE49-F238E27FC236}">
+                <a16:creationId xmlns:a16="http://schemas.microsoft.com/office/drawing/2014/main" id="{BD666A9C-C093-DAAB-8433-E94D1807ECE5}"/>
+              </a:ext>
+            </a:extLst>
+          </p:cNvPr>
+          <p:cNvSpPr>
+            <a:spLocks noChangeArrowheads="1"/>
+          </p:cNvSpPr>
+          <p:nvPr/>
+        </p:nvSpPr>
+        <p:spPr bwMode="auto">
+          <a:xfrm>
+            <a:off x="7299297" y="4800291"/>
+            <a:ext cx="3228229" cy="707886"/>
+          </a:xfrm>
+          <a:prstGeom prst="rect">
+            <a:avLst/>
+          </a:prstGeom>
+          <a:solidFill>
+            <a:srgbClr val="2B2B2B"/>
+          </a:solidFill>
+          <a:ln>
+            <a:noFill/>
+          </a:ln>
+          <a:effectLst/>
+          <a:extLst>
+            <a:ext uri="{91240B29-F687-4F45-9708-019B960494DF}">
+              <a14:hiddenLine xmlns:a14="http://schemas.microsoft.com/office/drawing/2010/main" w="9525">
+                <a:solidFill>
+                  <a:schemeClr val="tx1"/>
+                </a:solidFill>
+                <a:miter lim="800000"/>
+                <a:headEnd/>
+                <a:tailEnd/>
+              </a14:hiddenLine>
+            </a:ext>
+            <a:ext uri="{AF507438-7753-43E0-B8FC-AC1667EBCBE1}">
+              <a14:hiddenEffects xmlns:a14="http://schemas.microsoft.com/office/drawing/2010/main">
+                <a:effectLst>
+                  <a:outerShdw dist="35921" dir="2700000" algn="ctr" rotWithShape="0">
+                    <a:schemeClr val="bg2"/>
+                  </a:outerShdw>
+                </a:effectLst>
+              </a14:hiddenEffects>
+            </a:ext>
+          </a:extLst>
+        </p:spPr>
+        <p:txBody>
+          <a:bodyPr vert="horz" wrap="square" lIns="91440" tIns="45720" rIns="91440" bIns="45720" numCol="1" anchor="ctr" anchorCtr="0" compatLnSpc="1">
+            <a:prstTxWarp prst="textNoShape">
+              <a:avLst/>
+            </a:prstTxWarp>
+            <a:spAutoFit/>
+          </a:bodyPr>
+          <a:lstStyle/>
+          <a:p>
+            <a:pPr marL="0" marR="0" lvl="0" indent="0" algn="l" defTabSz="914400" rtl="0" eaLnBrk="0" fontAlgn="base" latinLnBrk="0" hangingPunct="0">
+              <a:lnSpc>
+                <a:spcPct val="100000"/>
+              </a:lnSpc>
+              <a:spcBef>
+                <a:spcPct val="0"/>
+              </a:spcBef>
+              <a:spcAft>
+                <a:spcPct val="0"/>
+              </a:spcAft>
+              <a:buClrTx/>
+              <a:buSzTx/>
+              <a:buFontTx/>
+              <a:buNone/>
+              <a:tabLst/>
+            </a:pPr>
+            <a:r>
+              <a:rPr kumimoji="0" lang="he-IL" altLang="he-IL" sz="1000" b="0" i="0" u="none" strike="noStrike" cap="none" normalizeH="0" baseline="0">
+                <a:ln>
+                  <a:noFill/>
+                </a:ln>
+                <a:solidFill>
+                  <a:srgbClr val="CC7832"/>
+                </a:solidFill>
+                <a:effectLst/>
+                <a:latin typeface="Arial Unicode MS"/>
+              </a:rPr>
+              <a:t>import </a:t>
+            </a:r>
+            <a:r>
+              <a:rPr kumimoji="0" lang="he-IL" altLang="he-IL" sz="1000" b="0" i="0" u="none" strike="noStrike" cap="none" normalizeH="0" baseline="0">
+                <a:ln>
+                  <a:noFill/>
+                </a:ln>
+                <a:solidFill>
+                  <a:srgbClr val="A9B7C6"/>
+                </a:solidFill>
+                <a:effectLst/>
+                <a:latin typeface="Arial Unicode MS"/>
+              </a:rPr>
+              <a:t>greetings</a:t>
+            </a:r>
+            <a:br>
+              <a:rPr kumimoji="0" lang="he-IL" altLang="he-IL" sz="1000" b="0" i="0" u="none" strike="noStrike" cap="none" normalizeH="0" baseline="0">
+                <a:ln>
+                  <a:noFill/>
+                </a:ln>
+                <a:solidFill>
+                  <a:srgbClr val="A9B7C6"/>
+                </a:solidFill>
+                <a:effectLst/>
+                <a:latin typeface="Arial Unicode MS"/>
+              </a:rPr>
+            </a:br>
+            <a:br>
+              <a:rPr kumimoji="0" lang="he-IL" altLang="he-IL" sz="1000" b="0" i="0" u="none" strike="noStrike" cap="none" normalizeH="0" baseline="0">
+                <a:ln>
+                  <a:noFill/>
+                </a:ln>
+                <a:solidFill>
+                  <a:srgbClr val="A9B7C6"/>
+                </a:solidFill>
+                <a:effectLst/>
+                <a:latin typeface="Arial Unicode MS"/>
+              </a:rPr>
+            </a:br>
+            <a:r>
+              <a:rPr kumimoji="0" lang="he-IL" altLang="he-IL" sz="1000" b="0" i="0" u="none" strike="noStrike" cap="none" normalizeH="0" baseline="0">
+                <a:ln>
+                  <a:noFill/>
+                </a:ln>
+                <a:solidFill>
+                  <a:srgbClr val="A9B7C6"/>
+                </a:solidFill>
+                <a:effectLst/>
+                <a:latin typeface="Arial Unicode MS"/>
+              </a:rPr>
+              <a:t>greetings.hello_english()  </a:t>
+            </a:r>
+            <a:r>
+              <a:rPr kumimoji="0" lang="he-IL" altLang="he-IL" sz="1000" b="0" i="0" u="none" strike="noStrike" cap="none" normalizeH="0" baseline="0">
+                <a:ln>
+                  <a:noFill/>
+                </a:ln>
+                <a:solidFill>
+                  <a:srgbClr val="808080"/>
+                </a:solidFill>
+                <a:effectLst/>
+                <a:latin typeface="Arial Unicode MS"/>
+              </a:rPr>
+              <a:t># Output: Hello!</a:t>
+            </a:r>
+            <a:br>
+              <a:rPr kumimoji="0" lang="he-IL" altLang="he-IL" sz="1000" b="0" i="0" u="none" strike="noStrike" cap="none" normalizeH="0" baseline="0">
+                <a:ln>
+                  <a:noFill/>
+                </a:ln>
+                <a:solidFill>
+                  <a:srgbClr val="808080"/>
+                </a:solidFill>
+                <a:effectLst/>
+                <a:latin typeface="Arial Unicode MS"/>
+              </a:rPr>
+            </a:br>
+            <a:r>
+              <a:rPr kumimoji="0" lang="he-IL" altLang="he-IL" sz="1000" b="0" i="0" u="none" strike="noStrike" cap="none" normalizeH="0" baseline="0">
+                <a:ln>
+                  <a:noFill/>
+                </a:ln>
+                <a:solidFill>
+                  <a:srgbClr val="A9B7C6"/>
+                </a:solidFill>
+                <a:effectLst/>
+                <a:latin typeface="Arial Unicode MS"/>
+              </a:rPr>
+              <a:t>greetings.hello_spanish()  </a:t>
+            </a:r>
+            <a:r>
+              <a:rPr kumimoji="0" lang="he-IL" altLang="he-IL" sz="1000" b="0" i="0" u="none" strike="noStrike" cap="none" normalizeH="0" baseline="0">
+                <a:ln>
+                  <a:noFill/>
+                </a:ln>
+                <a:solidFill>
+                  <a:srgbClr val="808080"/>
+                </a:solidFill>
+                <a:effectLst/>
+                <a:latin typeface="Arial Unicode MS"/>
+              </a:rPr>
+              <a:t># Output: ¡Hola!</a:t>
+            </a:r>
+            <a:endParaRPr kumimoji="0" lang="he-IL" altLang="he-IL" sz="1800" b="0" i="0" u="none" strike="noStrike" cap="none" normalizeH="0" baseline="0">
+              <a:ln>
+                <a:noFill/>
+              </a:ln>
+              <a:solidFill>
+                <a:schemeClr val="tx1"/>
+              </a:solidFill>
+              <a:effectLst/>
+              <a:latin typeface="Arial" panose="020B0604020202020204" pitchFamily="34" charset="0"/>
+            </a:endParaRPr>
+          </a:p>
+        </p:txBody>
+      </p:sp>
+      <p:sp>
+        <p:nvSpPr>
+          <p:cNvPr id="12" name="תיבת טקסט 11">
+            <a:extLst>
+              <a:ext uri="{FF2B5EF4-FFF2-40B4-BE49-F238E27FC236}">
+                <a16:creationId xmlns:a16="http://schemas.microsoft.com/office/drawing/2014/main" id="{88412B13-816F-7D10-A841-CDCB5B0C51F2}"/>
+              </a:ext>
+            </a:extLst>
+          </p:cNvPr>
+          <p:cNvSpPr txBox="1"/>
+          <p:nvPr/>
+        </p:nvSpPr>
+        <p:spPr>
+          <a:xfrm>
+            <a:off x="7451697" y="4448422"/>
+            <a:ext cx="3434964" cy="369332"/>
+          </a:xfrm>
+          <a:prstGeom prst="rect">
+            <a:avLst/>
+          </a:prstGeom>
+          <a:noFill/>
+        </p:spPr>
+        <p:txBody>
+          <a:bodyPr wrap="square" rtlCol="1">
+            <a:spAutoFit/>
+          </a:bodyPr>
+          <a:lstStyle/>
+          <a:p>
+            <a:r>
+              <a:rPr lang="en-US" dirty="0"/>
+              <a:t>Output: </a:t>
+            </a:r>
+            <a:endParaRPr lang="he-IL" dirty="0"/>
+          </a:p>
+        </p:txBody>
+      </p:sp>
+    </p:spTree>
+    <p:extLst>
+      <p:ext uri="{BB962C8B-B14F-4D97-AF65-F5344CB8AC3E}">
+        <p14:creationId xmlns:p14="http://schemas.microsoft.com/office/powerpoint/2010/main" val="155986256"/>
       </p:ext>
     </p:extLst>
   </p:cSld>
@@ -18366,10 +19828,122 @@
           <a:chExt cx="0" cy="0"/>
         </a:xfrm>
       </p:grpSpPr>
+      <p:sp>
+        <p:nvSpPr>
+          <p:cNvPr id="2" name="Title 1"/>
+          <p:cNvSpPr>
+            <a:spLocks noGrp="1"/>
+          </p:cNvSpPr>
+          <p:nvPr>
+            <p:ph type="title"/>
+          </p:nvPr>
+        </p:nvSpPr>
+        <p:spPr/>
+        <p:txBody>
+          <a:bodyPr>
+            <a:normAutofit/>
+          </a:bodyPr>
+          <a:lstStyle/>
+          <a:p>
+            <a:r>
+              <a:rPr lang="en-US" dirty="0">
+                <a:effectLst/>
+              </a:rPr>
+              <a:t>Locating Modules</a:t>
+            </a:r>
+            <a:endParaRPr lang="he-IL" dirty="0"/>
+          </a:p>
+        </p:txBody>
+      </p:sp>
+      <p:sp>
+        <p:nvSpPr>
+          <p:cNvPr id="3" name="Content Placeholder 2"/>
+          <p:cNvSpPr>
+            <a:spLocks noGrp="1"/>
+          </p:cNvSpPr>
+          <p:nvPr>
+            <p:ph idx="1"/>
+          </p:nvPr>
+        </p:nvSpPr>
+        <p:spPr/>
+        <p:txBody>
+          <a:bodyPr>
+            <a:normAutofit/>
+          </a:bodyPr>
+          <a:lstStyle/>
+          <a:p>
+            <a:r>
+              <a:rPr lang="en-US" dirty="0"/>
+              <a:t>When importing modules the interpreter  searches:</a:t>
+            </a:r>
+          </a:p>
+          <a:p>
+            <a:pPr lvl="1">
+              <a:spcAft>
+                <a:spcPts val="1800"/>
+              </a:spcAft>
+            </a:pPr>
+            <a:r>
+              <a:rPr lang="en-US" dirty="0"/>
+              <a:t>First interpreter searches in the current directory.</a:t>
+            </a:r>
+          </a:p>
+          <a:p>
+            <a:pPr lvl="1">
+              <a:spcAft>
+                <a:spcPts val="1800"/>
+              </a:spcAft>
+            </a:pPr>
+            <a:r>
+              <a:rPr lang="en-US" dirty="0"/>
+              <a:t>If the module isn't found, Python then searches each directory in the shell variable PYTHONPATH</a:t>
+            </a:r>
+          </a:p>
+          <a:p>
+            <a:pPr lvl="1">
+              <a:spcAft>
+                <a:spcPts val="1800"/>
+              </a:spcAft>
+            </a:pPr>
+            <a:r>
+              <a:rPr lang="en-US" dirty="0"/>
+              <a:t>If the module isn’t found, the interpreter searched in standard installation path. (In Linux/Unix for example in /</a:t>
+            </a:r>
+            <a:r>
+              <a:rPr lang="en-US" dirty="0" err="1"/>
+              <a:t>usr</a:t>
+            </a:r>
+            <a:r>
+              <a:rPr lang="en-US" dirty="0"/>
+              <a:t>/local/lib/python)</a:t>
+            </a:r>
+          </a:p>
+          <a:p>
+            <a:pPr lvl="1">
+              <a:spcAft>
+                <a:spcPts val="1800"/>
+              </a:spcAft>
+            </a:pPr>
+            <a:r>
+              <a:rPr lang="en-US" dirty="0"/>
+              <a:t>If the module is not found in any of the above locations, the interpreter raises an “</a:t>
+            </a:r>
+            <a:r>
+              <a:rPr lang="en-US" dirty="0" err="1"/>
+              <a:t>ImportError</a:t>
+            </a:r>
+            <a:r>
+              <a:rPr lang="en-US" dirty="0"/>
+              <a:t>” indicating that the module could not be found.</a:t>
+            </a:r>
+            <a:endParaRPr lang="he-IL" dirty="0"/>
+          </a:p>
+        </p:txBody>
+      </p:sp>
     </p:spTree>
     <p:extLst>
       <p:ext uri="{BB962C8B-B14F-4D97-AF65-F5344CB8AC3E}">
-        <p14:creationId xmlns:p14="http://schemas.microsoft.com/office/powerpoint/2010/main" val="1123853236"/>
+        <p14:creationId xmlns:p14="http://schemas.microsoft.com/office/powerpoint/2010/main" val="3629261822"/>
       </p:ext>
     </p:extLst>
   </p:cSld>
@@ -18512,6 +20086,200 @@
     <p:extLst>
       <p:ext uri="{BB962C8B-B14F-4D97-AF65-F5344CB8AC3E}">
         <p14:creationId xmlns:p14="http://schemas.microsoft.com/office/powerpoint/2010/main" val="89284741"/>
+      </p:ext>
+    </p:extLst>
+  </p:cSld>
+  <p:clrMapOvr>
+    <a:masterClrMapping/>
+  </p:clrMapOvr>
+</p:sld>
+</file>
+
+<file path=ppt/slides/slide30.xml><?xml version="1.0" encoding="utf-8"?>
+<p:sld xmlns:a="http://schemas.openxmlformats.org/drawingml/2006/main" xmlns:r="http://schemas.openxmlformats.org/officeDocument/2006/relationships" xmlns:p="http://schemas.openxmlformats.org/presentationml/2006/main">
+  <p:cSld>
+    <p:spTree>
+      <p:nvGrpSpPr>
+        <p:cNvPr id="1" name=""/>
+        <p:cNvGrpSpPr/>
+        <p:nvPr/>
+      </p:nvGrpSpPr>
+      <p:grpSpPr>
+        <a:xfrm>
+          <a:off x="0" y="0"/>
+          <a:ext cx="0" cy="0"/>
+          <a:chOff x="0" y="0"/>
+          <a:chExt cx="0" cy="0"/>
+        </a:xfrm>
+      </p:grpSpPr>
+      <p:sp>
+        <p:nvSpPr>
+          <p:cNvPr id="2" name="Title 1"/>
+          <p:cNvSpPr>
+            <a:spLocks noGrp="1"/>
+          </p:cNvSpPr>
+          <p:nvPr>
+            <p:ph type="title"/>
+          </p:nvPr>
+        </p:nvSpPr>
+        <p:spPr/>
+        <p:txBody>
+          <a:bodyPr>
+            <a:normAutofit/>
+          </a:bodyPr>
+          <a:lstStyle/>
+          <a:p>
+            <a:r>
+              <a:rPr lang="en-US" dirty="0"/>
+              <a:t>Python packages</a:t>
+            </a:r>
+            <a:endParaRPr lang="he-IL" dirty="0"/>
+          </a:p>
+        </p:txBody>
+      </p:sp>
+      <p:sp>
+        <p:nvSpPr>
+          <p:cNvPr id="3" name="Content Placeholder 2"/>
+          <p:cNvSpPr>
+            <a:spLocks noGrp="1"/>
+          </p:cNvSpPr>
+          <p:nvPr>
+            <p:ph idx="1"/>
+          </p:nvPr>
+        </p:nvSpPr>
+        <p:spPr/>
+        <p:txBody>
+          <a:bodyPr>
+            <a:normAutofit/>
+          </a:bodyPr>
+          <a:lstStyle/>
+          <a:p>
+            <a:r>
+              <a:rPr lang="en-US" sz="2400" dirty="0"/>
+              <a:t>To help organize modules and provide a naming hierarchy, python has a concept of packages</a:t>
+            </a:r>
+          </a:p>
+          <a:p>
+            <a:endParaRPr lang="en-US" sz="2400" dirty="0"/>
+          </a:p>
+          <a:p>
+            <a:r>
+              <a:rPr lang="en-US" sz="2400" dirty="0"/>
+              <a:t>The __init__.py files are required to make Python treat the directories as package</a:t>
+            </a:r>
+          </a:p>
+          <a:p>
+            <a:endParaRPr lang="en-US" sz="2400" dirty="0"/>
+          </a:p>
+          <a:p>
+            <a:r>
+              <a:rPr lang="en-US" sz="2400" dirty="0"/>
+              <a:t>Access to modules inside a package through the full name: </a:t>
+            </a:r>
+            <a:r>
+              <a:rPr lang="en-US" sz="2400" i="1" dirty="0" err="1"/>
+              <a:t>package_name.module_name</a:t>
+            </a:r>
+            <a:endParaRPr lang="en-US" sz="2400" i="1" dirty="0"/>
+          </a:p>
+          <a:p>
+            <a:endParaRPr lang="en-US" sz="2400" i="1" dirty="0"/>
+          </a:p>
+          <a:p>
+            <a:r>
+              <a:rPr lang="en-US" sz="2400" dirty="0"/>
+              <a:t>Packages can contains sub-packages </a:t>
+            </a:r>
+          </a:p>
+        </p:txBody>
+      </p:sp>
+    </p:spTree>
+    <p:extLst>
+      <p:ext uri="{BB962C8B-B14F-4D97-AF65-F5344CB8AC3E}">
+        <p14:creationId xmlns:p14="http://schemas.microsoft.com/office/powerpoint/2010/main" val="1171788004"/>
+      </p:ext>
+    </p:extLst>
+  </p:cSld>
+  <p:clrMapOvr>
+    <a:masterClrMapping/>
+  </p:clrMapOvr>
+</p:sld>
+</file>
+
+<file path=ppt/slides/slide31.xml><?xml version="1.0" encoding="utf-8"?>
+<p:sld xmlns:a="http://schemas.openxmlformats.org/drawingml/2006/main" xmlns:r="http://schemas.openxmlformats.org/officeDocument/2006/relationships" xmlns:p="http://schemas.openxmlformats.org/presentationml/2006/main">
+  <p:cSld>
+    <p:spTree>
+      <p:nvGrpSpPr>
+        <p:cNvPr id="1" name=""/>
+        <p:cNvGrpSpPr/>
+        <p:nvPr/>
+      </p:nvGrpSpPr>
+      <p:grpSpPr>
+        <a:xfrm>
+          <a:off x="0" y="0"/>
+          <a:ext cx="0" cy="0"/>
+          <a:chOff x="0" y="0"/>
+          <a:chExt cx="0" cy="0"/>
+        </a:xfrm>
+      </p:grpSpPr>
+      <p:sp>
+        <p:nvSpPr>
+          <p:cNvPr id="3" name="Title 2"/>
+          <p:cNvSpPr>
+            <a:spLocks noGrp="1"/>
+          </p:cNvSpPr>
+          <p:nvPr>
+            <p:ph type="title"/>
+          </p:nvPr>
+        </p:nvSpPr>
+        <p:spPr/>
+        <p:txBody>
+          <a:bodyPr/>
+          <a:lstStyle/>
+          <a:p>
+            <a:r>
+              <a:rPr lang="en-US"/>
+              <a:t>Lab 01</a:t>
+            </a:r>
+            <a:endParaRPr lang="he-IL"/>
+          </a:p>
+        </p:txBody>
+      </p:sp>
+    </p:spTree>
+    <p:extLst>
+      <p:ext uri="{BB962C8B-B14F-4D97-AF65-F5344CB8AC3E}">
+        <p14:creationId xmlns:p14="http://schemas.microsoft.com/office/powerpoint/2010/main" val="2767821557"/>
+      </p:ext>
+    </p:extLst>
+  </p:cSld>
+  <p:clrMapOvr>
+    <a:masterClrMapping/>
+  </p:clrMapOvr>
+</p:sld>
+</file>
+
+<file path=ppt/slides/slide32.xml><?xml version="1.0" encoding="utf-8"?>
+<p:sld xmlns:a="http://schemas.openxmlformats.org/drawingml/2006/main" xmlns:r="http://schemas.openxmlformats.org/officeDocument/2006/relationships" xmlns:p="http://schemas.openxmlformats.org/presentationml/2006/main">
+  <p:cSld>
+    <p:spTree>
+      <p:nvGrpSpPr>
+        <p:cNvPr id="1" name=""/>
+        <p:cNvGrpSpPr/>
+        <p:nvPr/>
+      </p:nvGrpSpPr>
+      <p:grpSpPr>
+        <a:xfrm>
+          <a:off x="0" y="0"/>
+          <a:ext cx="0" cy="0"/>
+          <a:chOff x="0" y="0"/>
+          <a:chExt cx="0" cy="0"/>
+        </a:xfrm>
+      </p:grpSpPr>
+    </p:spTree>
+    <p:extLst>
+      <p:ext uri="{BB962C8B-B14F-4D97-AF65-F5344CB8AC3E}">
+        <p14:creationId xmlns:p14="http://schemas.microsoft.com/office/powerpoint/2010/main" val="1123853236"/>
       </p:ext>
     </p:extLst>
   </p:cSld>

</xml_diff>